<commit_message>
complete js fundamental section
</commit_message>
<xml_diff>
--- a/2020-WebDev_js.pptx
+++ b/2020-WebDev_js.pptx
@@ -33,30 +33,36 @@
     <p:sldId id="278" r:id="rId28"/>
     <p:sldId id="279" r:id="rId29"/>
     <p:sldId id="280" r:id="rId30"/>
+    <p:sldId id="281" r:id="rId31"/>
+    <p:sldId id="282" r:id="rId32"/>
+    <p:sldId id="283" r:id="rId33"/>
+    <p:sldId id="284" r:id="rId34"/>
+    <p:sldId id="285" r:id="rId35"/>
+    <p:sldId id="286" r:id="rId36"/>
   </p:sldIdLst>
   <p:sldSz cy="5143500" cx="9144000"/>
   <p:notesSz cx="6858000" cy="9144000"/>
   <p:embeddedFontLst>
     <p:embeddedFont>
       <p:font typeface="Roboto Slab"/>
-      <p:regular r:id="rId31"/>
-      <p:bold r:id="rId32"/>
+      <p:regular r:id="rId37"/>
+      <p:bold r:id="rId38"/>
     </p:embeddedFont>
     <p:embeddedFont>
       <p:font typeface="Raleway"/>
-      <p:regular r:id="rId33"/>
-      <p:bold r:id="rId34"/>
-      <p:italic r:id="rId35"/>
-      <p:boldItalic r:id="rId36"/>
+      <p:regular r:id="rId39"/>
+      <p:bold r:id="rId40"/>
+      <p:italic r:id="rId41"/>
+      <p:boldItalic r:id="rId42"/>
     </p:embeddedFont>
     <p:embeddedFont>
       <p:font typeface="Average"/>
-      <p:regular r:id="rId37"/>
+      <p:regular r:id="rId43"/>
     </p:embeddedFont>
     <p:embeddedFont>
       <p:font typeface="Oswald"/>
-      <p:regular r:id="rId38"/>
-      <p:bold r:id="rId39"/>
+      <p:regular r:id="rId44"/>
+      <p:bold r:id="rId45"/>
     </p:embeddedFont>
   </p:embeddedFontLst>
   <p:defaultTextStyle>
@@ -2515,12 +2521,12 @@
 </p:notes>
 </file>
 
-<file path=ppt/notesSlides/notesSlide3.xml><?xml version="1.0" encoding="utf-8"?>
+<file path=ppt/notesSlides/notesSlide26.xml><?xml version="1.0" encoding="utf-8"?>
 <p:notes xmlns:a="http://schemas.openxmlformats.org/drawingml/2006/main" xmlns:r="http://schemas.openxmlformats.org/officeDocument/2006/relationships" xmlns:mc="http://schemas.openxmlformats.org/markup-compatibility/2006" xmlns:mv="urn:schemas-microsoft-com:mac:vml" xmlns:p="http://schemas.openxmlformats.org/presentationml/2006/main" xmlns:c="http://schemas.openxmlformats.org/drawingml/2006/chart" xmlns:dgm="http://schemas.openxmlformats.org/drawingml/2006/diagram" xmlns:o="urn:schemas-microsoft-com:office:office" xmlns:v="urn:schemas-microsoft-com:vml" xmlns:pvml="urn:schemas-microsoft-com:office:powerpoint" xmlns:com="http://schemas.openxmlformats.org/drawingml/2006/compatibility" xmlns:p14="http://schemas.microsoft.com/office/powerpoint/2010/main" xmlns:p15="http://schemas.microsoft.com/office/powerpoint/2012/main" showMasterPhAnim="0" showMasterSp="0">
   <p:cSld>
     <p:spTree>
       <p:nvGrpSpPr>
-        <p:cNvPr id="70" name="Shape 70"/>
+        <p:cNvPr id="262" name="Shape 262"/>
         <p:cNvGrpSpPr/>
         <p:nvPr/>
       </p:nvGrpSpPr>
@@ -2534,7 +2540,7 @@
       </p:grpSpPr>
       <p:sp>
         <p:nvSpPr>
-          <p:cNvPr id="71" name="Google Shape;71;g6f0f9cd2d3_0_1:notes"/>
+          <p:cNvPr id="263" name="Google Shape;263;g6fd988336f_0_0:notes"/>
           <p:cNvSpPr/>
           <p:nvPr>
             <p:ph idx="2" type="sldImg"/>
@@ -2569,7 +2575,601 @@
       </p:sp>
       <p:sp>
         <p:nvSpPr>
+          <p:cNvPr id="264" name="Google Shape;264;g6fd988336f_0_0:notes"/>
+          <p:cNvSpPr txBox="1"/>
+          <p:nvPr>
+            <p:ph idx="1" type="body"/>
+          </p:nvPr>
+        </p:nvSpPr>
+        <p:spPr>
+          <a:xfrm>
+            <a:off x="685800" y="4343400"/>
+            <a:ext cx="5486400" cy="4114800"/>
+          </a:xfrm>
+          <a:prstGeom prst="rect">
+            <a:avLst/>
+          </a:prstGeom>
+        </p:spPr>
+        <p:txBody>
+          <a:bodyPr anchorCtr="0" anchor="t" bIns="91425" lIns="91425" spcFirstLastPara="1" rIns="91425" wrap="square" tIns="91425">
+            <a:noAutofit/>
+          </a:bodyPr>
+          <a:lstStyle/>
+          <a:p>
+            <a:pPr indent="0" lvl="0" marL="0" rtl="0" algn="l">
+              <a:spcBef>
+                <a:spcPts val="0"/>
+              </a:spcBef>
+              <a:spcAft>
+                <a:spcPts val="0"/>
+              </a:spcAft>
+              <a:buNone/>
+            </a:pPr>
+            <a:r>
+              <a:t/>
+            </a:r>
+            <a:endParaRPr/>
+          </a:p>
+        </p:txBody>
+      </p:sp>
+    </p:spTree>
+  </p:cSld>
+  <p:clrMapOvr>
+    <a:masterClrMapping/>
+  </p:clrMapOvr>
+</p:notes>
+</file>
+
+<file path=ppt/notesSlides/notesSlide27.xml><?xml version="1.0" encoding="utf-8"?>
+<p:notes xmlns:a="http://schemas.openxmlformats.org/drawingml/2006/main" xmlns:r="http://schemas.openxmlformats.org/officeDocument/2006/relationships" xmlns:mc="http://schemas.openxmlformats.org/markup-compatibility/2006" xmlns:mv="urn:schemas-microsoft-com:mac:vml" xmlns:p="http://schemas.openxmlformats.org/presentationml/2006/main" xmlns:c="http://schemas.openxmlformats.org/drawingml/2006/chart" xmlns:dgm="http://schemas.openxmlformats.org/drawingml/2006/diagram" xmlns:o="urn:schemas-microsoft-com:office:office" xmlns:v="urn:schemas-microsoft-com:vml" xmlns:pvml="urn:schemas-microsoft-com:office:powerpoint" xmlns:com="http://schemas.openxmlformats.org/drawingml/2006/compatibility" xmlns:p14="http://schemas.microsoft.com/office/powerpoint/2010/main" xmlns:p15="http://schemas.microsoft.com/office/powerpoint/2012/main" showMasterPhAnim="0" showMasterSp="0">
+  <p:cSld>
+    <p:spTree>
+      <p:nvGrpSpPr>
+        <p:cNvPr id="269" name="Shape 269"/>
+        <p:cNvGrpSpPr/>
+        <p:nvPr/>
+      </p:nvGrpSpPr>
+      <p:grpSpPr>
+        <a:xfrm>
+          <a:off x="0" y="0"/>
+          <a:ext cx="0" cy="0"/>
+          <a:chOff x="0" y="0"/>
+          <a:chExt cx="0" cy="0"/>
+        </a:xfrm>
+      </p:grpSpPr>
+      <p:sp>
+        <p:nvSpPr>
+          <p:cNvPr id="270" name="Google Shape;270;g6fd988336f_0_6:notes"/>
+          <p:cNvSpPr/>
+          <p:nvPr>
+            <p:ph idx="2" type="sldImg"/>
+          </p:nvPr>
+        </p:nvSpPr>
+        <p:spPr>
+          <a:xfrm>
+            <a:off x="381300" y="685800"/>
+            <a:ext cx="6096000" cy="3429000"/>
+          </a:xfrm>
+          <a:custGeom>
+            <a:rect b="b" l="l" r="r" t="t"/>
+            <a:pathLst>
+              <a:path extrusionOk="0" h="120000" w="120000">
+                <a:moveTo>
+                  <a:pt x="0" y="0"/>
+                </a:moveTo>
+                <a:lnTo>
+                  <a:pt x="120000" y="0"/>
+                </a:lnTo>
+                <a:lnTo>
+                  <a:pt x="120000" y="120000"/>
+                </a:lnTo>
+                <a:lnTo>
+                  <a:pt x="0" y="120000"/>
+                </a:lnTo>
+                <a:close/>
+              </a:path>
+            </a:pathLst>
+          </a:custGeom>
+        </p:spPr>
+      </p:sp>
+      <p:sp>
+        <p:nvSpPr>
+          <p:cNvPr id="271" name="Google Shape;271;g6fd988336f_0_6:notes"/>
+          <p:cNvSpPr txBox="1"/>
+          <p:nvPr>
+            <p:ph idx="1" type="body"/>
+          </p:nvPr>
+        </p:nvSpPr>
+        <p:spPr>
+          <a:xfrm>
+            <a:off x="685800" y="4343400"/>
+            <a:ext cx="5486400" cy="4114800"/>
+          </a:xfrm>
+          <a:prstGeom prst="rect">
+            <a:avLst/>
+          </a:prstGeom>
+        </p:spPr>
+        <p:txBody>
+          <a:bodyPr anchorCtr="0" anchor="t" bIns="91425" lIns="91425" spcFirstLastPara="1" rIns="91425" wrap="square" tIns="91425">
+            <a:noAutofit/>
+          </a:bodyPr>
+          <a:lstStyle/>
+          <a:p>
+            <a:pPr indent="0" lvl="0" marL="0" rtl="0" algn="l">
+              <a:spcBef>
+                <a:spcPts val="0"/>
+              </a:spcBef>
+              <a:spcAft>
+                <a:spcPts val="0"/>
+              </a:spcAft>
+              <a:buNone/>
+            </a:pPr>
+            <a:r>
+              <a:t/>
+            </a:r>
+            <a:endParaRPr/>
+          </a:p>
+        </p:txBody>
+      </p:sp>
+    </p:spTree>
+  </p:cSld>
+  <p:clrMapOvr>
+    <a:masterClrMapping/>
+  </p:clrMapOvr>
+</p:notes>
+</file>
+
+<file path=ppt/notesSlides/notesSlide28.xml><?xml version="1.0" encoding="utf-8"?>
+<p:notes xmlns:a="http://schemas.openxmlformats.org/drawingml/2006/main" xmlns:r="http://schemas.openxmlformats.org/officeDocument/2006/relationships" xmlns:mc="http://schemas.openxmlformats.org/markup-compatibility/2006" xmlns:mv="urn:schemas-microsoft-com:mac:vml" xmlns:p="http://schemas.openxmlformats.org/presentationml/2006/main" xmlns:c="http://schemas.openxmlformats.org/drawingml/2006/chart" xmlns:dgm="http://schemas.openxmlformats.org/drawingml/2006/diagram" xmlns:o="urn:schemas-microsoft-com:office:office" xmlns:v="urn:schemas-microsoft-com:vml" xmlns:pvml="urn:schemas-microsoft-com:office:powerpoint" xmlns:com="http://schemas.openxmlformats.org/drawingml/2006/compatibility" xmlns:p14="http://schemas.microsoft.com/office/powerpoint/2010/main" xmlns:p15="http://schemas.microsoft.com/office/powerpoint/2012/main" showMasterPhAnim="0" showMasterSp="0">
+  <p:cSld>
+    <p:spTree>
+      <p:nvGrpSpPr>
+        <p:cNvPr id="276" name="Shape 276"/>
+        <p:cNvGrpSpPr/>
+        <p:nvPr/>
+      </p:nvGrpSpPr>
+      <p:grpSpPr>
+        <a:xfrm>
+          <a:off x="0" y="0"/>
+          <a:ext cx="0" cy="0"/>
+          <a:chOff x="0" y="0"/>
+          <a:chExt cx="0" cy="0"/>
+        </a:xfrm>
+      </p:grpSpPr>
+      <p:sp>
+        <p:nvSpPr>
+          <p:cNvPr id="277" name="Google Shape;277;g6fd988336f_0_12:notes"/>
+          <p:cNvSpPr/>
+          <p:nvPr>
+            <p:ph idx="2" type="sldImg"/>
+          </p:nvPr>
+        </p:nvSpPr>
+        <p:spPr>
+          <a:xfrm>
+            <a:off x="381300" y="685800"/>
+            <a:ext cx="6096000" cy="3429000"/>
+          </a:xfrm>
+          <a:custGeom>
+            <a:rect b="b" l="l" r="r" t="t"/>
+            <a:pathLst>
+              <a:path extrusionOk="0" h="120000" w="120000">
+                <a:moveTo>
+                  <a:pt x="0" y="0"/>
+                </a:moveTo>
+                <a:lnTo>
+                  <a:pt x="120000" y="0"/>
+                </a:lnTo>
+                <a:lnTo>
+                  <a:pt x="120000" y="120000"/>
+                </a:lnTo>
+                <a:lnTo>
+                  <a:pt x="0" y="120000"/>
+                </a:lnTo>
+                <a:close/>
+              </a:path>
+            </a:pathLst>
+          </a:custGeom>
+        </p:spPr>
+      </p:sp>
+      <p:sp>
+        <p:nvSpPr>
+          <p:cNvPr id="278" name="Google Shape;278;g6fd988336f_0_12:notes"/>
+          <p:cNvSpPr txBox="1"/>
+          <p:nvPr>
+            <p:ph idx="1" type="body"/>
+          </p:nvPr>
+        </p:nvSpPr>
+        <p:spPr>
+          <a:xfrm>
+            <a:off x="685800" y="4343400"/>
+            <a:ext cx="5486400" cy="4114800"/>
+          </a:xfrm>
+          <a:prstGeom prst="rect">
+            <a:avLst/>
+          </a:prstGeom>
+        </p:spPr>
+        <p:txBody>
+          <a:bodyPr anchorCtr="0" anchor="t" bIns="91425" lIns="91425" spcFirstLastPara="1" rIns="91425" wrap="square" tIns="91425">
+            <a:noAutofit/>
+          </a:bodyPr>
+          <a:lstStyle/>
+          <a:p>
+            <a:pPr indent="0" lvl="0" marL="0" rtl="0" algn="l">
+              <a:spcBef>
+                <a:spcPts val="0"/>
+              </a:spcBef>
+              <a:spcAft>
+                <a:spcPts val="0"/>
+              </a:spcAft>
+              <a:buNone/>
+            </a:pPr>
+            <a:r>
+              <a:t/>
+            </a:r>
+            <a:endParaRPr/>
+          </a:p>
+        </p:txBody>
+      </p:sp>
+    </p:spTree>
+  </p:cSld>
+  <p:clrMapOvr>
+    <a:masterClrMapping/>
+  </p:clrMapOvr>
+</p:notes>
+</file>
+
+<file path=ppt/notesSlides/notesSlide29.xml><?xml version="1.0" encoding="utf-8"?>
+<p:notes xmlns:a="http://schemas.openxmlformats.org/drawingml/2006/main" xmlns:r="http://schemas.openxmlformats.org/officeDocument/2006/relationships" xmlns:mc="http://schemas.openxmlformats.org/markup-compatibility/2006" xmlns:mv="urn:schemas-microsoft-com:mac:vml" xmlns:p="http://schemas.openxmlformats.org/presentationml/2006/main" xmlns:c="http://schemas.openxmlformats.org/drawingml/2006/chart" xmlns:dgm="http://schemas.openxmlformats.org/drawingml/2006/diagram" xmlns:o="urn:schemas-microsoft-com:office:office" xmlns:v="urn:schemas-microsoft-com:vml" xmlns:pvml="urn:schemas-microsoft-com:office:powerpoint" xmlns:com="http://schemas.openxmlformats.org/drawingml/2006/compatibility" xmlns:p14="http://schemas.microsoft.com/office/powerpoint/2010/main" xmlns:p15="http://schemas.microsoft.com/office/powerpoint/2012/main" showMasterPhAnim="0" showMasterSp="0">
+  <p:cSld>
+    <p:spTree>
+      <p:nvGrpSpPr>
+        <p:cNvPr id="283" name="Shape 283"/>
+        <p:cNvGrpSpPr/>
+        <p:nvPr/>
+      </p:nvGrpSpPr>
+      <p:grpSpPr>
+        <a:xfrm>
+          <a:off x="0" y="0"/>
+          <a:ext cx="0" cy="0"/>
+          <a:chOff x="0" y="0"/>
+          <a:chExt cx="0" cy="0"/>
+        </a:xfrm>
+      </p:grpSpPr>
+      <p:sp>
+        <p:nvSpPr>
+          <p:cNvPr id="284" name="Google Shape;284;g6fd988336f_0_18:notes"/>
+          <p:cNvSpPr/>
+          <p:nvPr>
+            <p:ph idx="2" type="sldImg"/>
+          </p:nvPr>
+        </p:nvSpPr>
+        <p:spPr>
+          <a:xfrm>
+            <a:off x="381300" y="685800"/>
+            <a:ext cx="6096000" cy="3429000"/>
+          </a:xfrm>
+          <a:custGeom>
+            <a:rect b="b" l="l" r="r" t="t"/>
+            <a:pathLst>
+              <a:path extrusionOk="0" h="120000" w="120000">
+                <a:moveTo>
+                  <a:pt x="0" y="0"/>
+                </a:moveTo>
+                <a:lnTo>
+                  <a:pt x="120000" y="0"/>
+                </a:lnTo>
+                <a:lnTo>
+                  <a:pt x="120000" y="120000"/>
+                </a:lnTo>
+                <a:lnTo>
+                  <a:pt x="0" y="120000"/>
+                </a:lnTo>
+                <a:close/>
+              </a:path>
+            </a:pathLst>
+          </a:custGeom>
+        </p:spPr>
+      </p:sp>
+      <p:sp>
+        <p:nvSpPr>
+          <p:cNvPr id="285" name="Google Shape;285;g6fd988336f_0_18:notes"/>
+          <p:cNvSpPr txBox="1"/>
+          <p:nvPr>
+            <p:ph idx="1" type="body"/>
+          </p:nvPr>
+        </p:nvSpPr>
+        <p:spPr>
+          <a:xfrm>
+            <a:off x="685800" y="4343400"/>
+            <a:ext cx="5486400" cy="4114800"/>
+          </a:xfrm>
+          <a:prstGeom prst="rect">
+            <a:avLst/>
+          </a:prstGeom>
+        </p:spPr>
+        <p:txBody>
+          <a:bodyPr anchorCtr="0" anchor="t" bIns="91425" lIns="91425" spcFirstLastPara="1" rIns="91425" wrap="square" tIns="91425">
+            <a:noAutofit/>
+          </a:bodyPr>
+          <a:lstStyle/>
+          <a:p>
+            <a:pPr indent="0" lvl="0" marL="0" rtl="0" algn="l">
+              <a:spcBef>
+                <a:spcPts val="0"/>
+              </a:spcBef>
+              <a:spcAft>
+                <a:spcPts val="0"/>
+              </a:spcAft>
+              <a:buNone/>
+            </a:pPr>
+            <a:r>
+              <a:t/>
+            </a:r>
+            <a:endParaRPr/>
+          </a:p>
+        </p:txBody>
+      </p:sp>
+    </p:spTree>
+  </p:cSld>
+  <p:clrMapOvr>
+    <a:masterClrMapping/>
+  </p:clrMapOvr>
+</p:notes>
+</file>
+
+<file path=ppt/notesSlides/notesSlide3.xml><?xml version="1.0" encoding="utf-8"?>
+<p:notes xmlns:a="http://schemas.openxmlformats.org/drawingml/2006/main" xmlns:r="http://schemas.openxmlformats.org/officeDocument/2006/relationships" xmlns:mc="http://schemas.openxmlformats.org/markup-compatibility/2006" xmlns:mv="urn:schemas-microsoft-com:mac:vml" xmlns:p="http://schemas.openxmlformats.org/presentationml/2006/main" xmlns:c="http://schemas.openxmlformats.org/drawingml/2006/chart" xmlns:dgm="http://schemas.openxmlformats.org/drawingml/2006/diagram" xmlns:o="urn:schemas-microsoft-com:office:office" xmlns:v="urn:schemas-microsoft-com:vml" xmlns:pvml="urn:schemas-microsoft-com:office:powerpoint" xmlns:com="http://schemas.openxmlformats.org/drawingml/2006/compatibility" xmlns:p14="http://schemas.microsoft.com/office/powerpoint/2010/main" xmlns:p15="http://schemas.microsoft.com/office/powerpoint/2012/main" showMasterPhAnim="0" showMasterSp="0">
+  <p:cSld>
+    <p:spTree>
+      <p:nvGrpSpPr>
+        <p:cNvPr id="70" name="Shape 70"/>
+        <p:cNvGrpSpPr/>
+        <p:nvPr/>
+      </p:nvGrpSpPr>
+      <p:grpSpPr>
+        <a:xfrm>
+          <a:off x="0" y="0"/>
+          <a:ext cx="0" cy="0"/>
+          <a:chOff x="0" y="0"/>
+          <a:chExt cx="0" cy="0"/>
+        </a:xfrm>
+      </p:grpSpPr>
+      <p:sp>
+        <p:nvSpPr>
+          <p:cNvPr id="71" name="Google Shape;71;g6f0f9cd2d3_0_1:notes"/>
+          <p:cNvSpPr/>
+          <p:nvPr>
+            <p:ph idx="2" type="sldImg"/>
+          </p:nvPr>
+        </p:nvSpPr>
+        <p:spPr>
+          <a:xfrm>
+            <a:off x="381300" y="685800"/>
+            <a:ext cx="6096000" cy="3429000"/>
+          </a:xfrm>
+          <a:custGeom>
+            <a:rect b="b" l="l" r="r" t="t"/>
+            <a:pathLst>
+              <a:path extrusionOk="0" h="120000" w="120000">
+                <a:moveTo>
+                  <a:pt x="0" y="0"/>
+                </a:moveTo>
+                <a:lnTo>
+                  <a:pt x="120000" y="0"/>
+                </a:lnTo>
+                <a:lnTo>
+                  <a:pt x="120000" y="120000"/>
+                </a:lnTo>
+                <a:lnTo>
+                  <a:pt x="0" y="120000"/>
+                </a:lnTo>
+                <a:close/>
+              </a:path>
+            </a:pathLst>
+          </a:custGeom>
+        </p:spPr>
+      </p:sp>
+      <p:sp>
+        <p:nvSpPr>
           <p:cNvPr id="72" name="Google Shape;72;g6f0f9cd2d3_0_1:notes"/>
+          <p:cNvSpPr txBox="1"/>
+          <p:nvPr>
+            <p:ph idx="1" type="body"/>
+          </p:nvPr>
+        </p:nvSpPr>
+        <p:spPr>
+          <a:xfrm>
+            <a:off x="685800" y="4343400"/>
+            <a:ext cx="5486400" cy="4114800"/>
+          </a:xfrm>
+          <a:prstGeom prst="rect">
+            <a:avLst/>
+          </a:prstGeom>
+        </p:spPr>
+        <p:txBody>
+          <a:bodyPr anchorCtr="0" anchor="t" bIns="91425" lIns="91425" spcFirstLastPara="1" rIns="91425" wrap="square" tIns="91425">
+            <a:noAutofit/>
+          </a:bodyPr>
+          <a:lstStyle/>
+          <a:p>
+            <a:pPr indent="0" lvl="0" marL="0" rtl="0" algn="l">
+              <a:spcBef>
+                <a:spcPts val="0"/>
+              </a:spcBef>
+              <a:spcAft>
+                <a:spcPts val="0"/>
+              </a:spcAft>
+              <a:buNone/>
+            </a:pPr>
+            <a:r>
+              <a:t/>
+            </a:r>
+            <a:endParaRPr/>
+          </a:p>
+        </p:txBody>
+      </p:sp>
+    </p:spTree>
+  </p:cSld>
+  <p:clrMapOvr>
+    <a:masterClrMapping/>
+  </p:clrMapOvr>
+</p:notes>
+</file>
+
+<file path=ppt/notesSlides/notesSlide30.xml><?xml version="1.0" encoding="utf-8"?>
+<p:notes xmlns:a="http://schemas.openxmlformats.org/drawingml/2006/main" xmlns:r="http://schemas.openxmlformats.org/officeDocument/2006/relationships" xmlns:mc="http://schemas.openxmlformats.org/markup-compatibility/2006" xmlns:mv="urn:schemas-microsoft-com:mac:vml" xmlns:p="http://schemas.openxmlformats.org/presentationml/2006/main" xmlns:c="http://schemas.openxmlformats.org/drawingml/2006/chart" xmlns:dgm="http://schemas.openxmlformats.org/drawingml/2006/diagram" xmlns:o="urn:schemas-microsoft-com:office:office" xmlns:v="urn:schemas-microsoft-com:vml" xmlns:pvml="urn:schemas-microsoft-com:office:powerpoint" xmlns:com="http://schemas.openxmlformats.org/drawingml/2006/compatibility" xmlns:p14="http://schemas.microsoft.com/office/powerpoint/2010/main" xmlns:p15="http://schemas.microsoft.com/office/powerpoint/2012/main" showMasterPhAnim="0" showMasterSp="0">
+  <p:cSld>
+    <p:spTree>
+      <p:nvGrpSpPr>
+        <p:cNvPr id="290" name="Shape 290"/>
+        <p:cNvGrpSpPr/>
+        <p:nvPr/>
+      </p:nvGrpSpPr>
+      <p:grpSpPr>
+        <a:xfrm>
+          <a:off x="0" y="0"/>
+          <a:ext cx="0" cy="0"/>
+          <a:chOff x="0" y="0"/>
+          <a:chExt cx="0" cy="0"/>
+        </a:xfrm>
+      </p:grpSpPr>
+      <p:sp>
+        <p:nvSpPr>
+          <p:cNvPr id="291" name="Google Shape;291;g6fd988336f_0_24:notes"/>
+          <p:cNvSpPr/>
+          <p:nvPr>
+            <p:ph idx="2" type="sldImg"/>
+          </p:nvPr>
+        </p:nvSpPr>
+        <p:spPr>
+          <a:xfrm>
+            <a:off x="381300" y="685800"/>
+            <a:ext cx="6096000" cy="3429000"/>
+          </a:xfrm>
+          <a:custGeom>
+            <a:rect b="b" l="l" r="r" t="t"/>
+            <a:pathLst>
+              <a:path extrusionOk="0" h="120000" w="120000">
+                <a:moveTo>
+                  <a:pt x="0" y="0"/>
+                </a:moveTo>
+                <a:lnTo>
+                  <a:pt x="120000" y="0"/>
+                </a:lnTo>
+                <a:lnTo>
+                  <a:pt x="120000" y="120000"/>
+                </a:lnTo>
+                <a:lnTo>
+                  <a:pt x="0" y="120000"/>
+                </a:lnTo>
+                <a:close/>
+              </a:path>
+            </a:pathLst>
+          </a:custGeom>
+        </p:spPr>
+      </p:sp>
+      <p:sp>
+        <p:nvSpPr>
+          <p:cNvPr id="292" name="Google Shape;292;g6fd988336f_0_24:notes"/>
+          <p:cNvSpPr txBox="1"/>
+          <p:nvPr>
+            <p:ph idx="1" type="body"/>
+          </p:nvPr>
+        </p:nvSpPr>
+        <p:spPr>
+          <a:xfrm>
+            <a:off x="685800" y="4343400"/>
+            <a:ext cx="5486400" cy="4114800"/>
+          </a:xfrm>
+          <a:prstGeom prst="rect">
+            <a:avLst/>
+          </a:prstGeom>
+        </p:spPr>
+        <p:txBody>
+          <a:bodyPr anchorCtr="0" anchor="t" bIns="91425" lIns="91425" spcFirstLastPara="1" rIns="91425" wrap="square" tIns="91425">
+            <a:noAutofit/>
+          </a:bodyPr>
+          <a:lstStyle/>
+          <a:p>
+            <a:pPr indent="0" lvl="0" marL="0" rtl="0" algn="l">
+              <a:spcBef>
+                <a:spcPts val="0"/>
+              </a:spcBef>
+              <a:spcAft>
+                <a:spcPts val="0"/>
+              </a:spcAft>
+              <a:buNone/>
+            </a:pPr>
+            <a:r>
+              <a:t/>
+            </a:r>
+            <a:endParaRPr/>
+          </a:p>
+        </p:txBody>
+      </p:sp>
+    </p:spTree>
+  </p:cSld>
+  <p:clrMapOvr>
+    <a:masterClrMapping/>
+  </p:clrMapOvr>
+</p:notes>
+</file>
+
+<file path=ppt/notesSlides/notesSlide31.xml><?xml version="1.0" encoding="utf-8"?>
+<p:notes xmlns:a="http://schemas.openxmlformats.org/drawingml/2006/main" xmlns:r="http://schemas.openxmlformats.org/officeDocument/2006/relationships" xmlns:mc="http://schemas.openxmlformats.org/markup-compatibility/2006" xmlns:mv="urn:schemas-microsoft-com:mac:vml" xmlns:p="http://schemas.openxmlformats.org/presentationml/2006/main" xmlns:c="http://schemas.openxmlformats.org/drawingml/2006/chart" xmlns:dgm="http://schemas.openxmlformats.org/drawingml/2006/diagram" xmlns:o="urn:schemas-microsoft-com:office:office" xmlns:v="urn:schemas-microsoft-com:vml" xmlns:pvml="urn:schemas-microsoft-com:office:powerpoint" xmlns:com="http://schemas.openxmlformats.org/drawingml/2006/compatibility" xmlns:p14="http://schemas.microsoft.com/office/powerpoint/2010/main" xmlns:p15="http://schemas.microsoft.com/office/powerpoint/2012/main" showMasterPhAnim="0" showMasterSp="0">
+  <p:cSld>
+    <p:spTree>
+      <p:nvGrpSpPr>
+        <p:cNvPr id="297" name="Shape 297"/>
+        <p:cNvGrpSpPr/>
+        <p:nvPr/>
+      </p:nvGrpSpPr>
+      <p:grpSpPr>
+        <a:xfrm>
+          <a:off x="0" y="0"/>
+          <a:ext cx="0" cy="0"/>
+          <a:chOff x="0" y="0"/>
+          <a:chExt cx="0" cy="0"/>
+        </a:xfrm>
+      </p:grpSpPr>
+      <p:sp>
+        <p:nvSpPr>
+          <p:cNvPr id="298" name="Google Shape;298;g6fd988336f_0_30:notes"/>
+          <p:cNvSpPr/>
+          <p:nvPr>
+            <p:ph idx="2" type="sldImg"/>
+          </p:nvPr>
+        </p:nvSpPr>
+        <p:spPr>
+          <a:xfrm>
+            <a:off x="381300" y="685800"/>
+            <a:ext cx="6096000" cy="3429000"/>
+          </a:xfrm>
+          <a:custGeom>
+            <a:rect b="b" l="l" r="r" t="t"/>
+            <a:pathLst>
+              <a:path extrusionOk="0" h="120000" w="120000">
+                <a:moveTo>
+                  <a:pt x="0" y="0"/>
+                </a:moveTo>
+                <a:lnTo>
+                  <a:pt x="120000" y="0"/>
+                </a:lnTo>
+                <a:lnTo>
+                  <a:pt x="120000" y="120000"/>
+                </a:lnTo>
+                <a:lnTo>
+                  <a:pt x="0" y="120000"/>
+                </a:lnTo>
+                <a:close/>
+              </a:path>
+            </a:pathLst>
+          </a:custGeom>
+        </p:spPr>
+      </p:sp>
+      <p:sp>
+        <p:nvSpPr>
+          <p:cNvPr id="299" name="Google Shape;299;g6fd988336f_0_30:notes"/>
           <p:cNvSpPr txBox="1"/>
           <p:nvPr>
             <p:ph idx="1" type="body"/>
@@ -13672,6 +14272,662 @@
 </p:sld>
 </file>
 
+<file path=ppt/slides/slide26.xml><?xml version="1.0" encoding="utf-8"?>
+<p:sld xmlns:a="http://schemas.openxmlformats.org/drawingml/2006/main" xmlns:r="http://schemas.openxmlformats.org/officeDocument/2006/relationships" xmlns:mc="http://schemas.openxmlformats.org/markup-compatibility/2006" xmlns:mv="urn:schemas-microsoft-com:mac:vml" xmlns:p="http://schemas.openxmlformats.org/presentationml/2006/main" xmlns:c="http://schemas.openxmlformats.org/drawingml/2006/chart" xmlns:dgm="http://schemas.openxmlformats.org/drawingml/2006/diagram" xmlns:o="urn:schemas-microsoft-com:office:office" xmlns:v="urn:schemas-microsoft-com:vml" xmlns:pvml="urn:schemas-microsoft-com:office:powerpoint" xmlns:com="http://schemas.openxmlformats.org/drawingml/2006/compatibility" xmlns:p14="http://schemas.microsoft.com/office/powerpoint/2010/main" xmlns:p15="http://schemas.microsoft.com/office/powerpoint/2012/main">
+  <p:cSld>
+    <p:spTree>
+      <p:nvGrpSpPr>
+        <p:cNvPr id="265" name="Shape 265"/>
+        <p:cNvGrpSpPr/>
+        <p:nvPr/>
+      </p:nvGrpSpPr>
+      <p:grpSpPr>
+        <a:xfrm>
+          <a:off x="0" y="0"/>
+          <a:ext cx="0" cy="0"/>
+          <a:chOff x="0" y="0"/>
+          <a:chExt cx="0" cy="0"/>
+        </a:xfrm>
+      </p:grpSpPr>
+      <p:sp>
+        <p:nvSpPr>
+          <p:cNvPr id="266" name="Google Shape;266;p38"/>
+          <p:cNvSpPr txBox="1"/>
+          <p:nvPr>
+            <p:ph type="title"/>
+          </p:nvPr>
+        </p:nvSpPr>
+        <p:spPr>
+          <a:xfrm>
+            <a:off x="671250" y="2141250"/>
+            <a:ext cx="7852200" cy="861000"/>
+          </a:xfrm>
+          <a:prstGeom prst="rect">
+            <a:avLst/>
+          </a:prstGeom>
+        </p:spPr>
+        <p:txBody>
+          <a:bodyPr anchorCtr="0" anchor="ctr" bIns="91425" lIns="91425" spcFirstLastPara="1" rIns="91425" wrap="square" tIns="91425">
+            <a:noAutofit/>
+          </a:bodyPr>
+          <a:lstStyle/>
+          <a:p>
+            <a:pPr indent="0" lvl="0" marL="0" rtl="0" algn="ctr">
+              <a:spcBef>
+                <a:spcPts val="0"/>
+              </a:spcBef>
+              <a:spcAft>
+                <a:spcPts val="0"/>
+              </a:spcAft>
+              <a:buNone/>
+            </a:pPr>
+            <a:r>
+              <a:rPr lang="en"/>
+              <a:t>IF </a:t>
+            </a:r>
+            <a:r>
+              <a:rPr lang="en"/>
+              <a:t>Statement</a:t>
+            </a:r>
+            <a:endParaRPr/>
+          </a:p>
+        </p:txBody>
+      </p:sp>
+      <p:sp>
+        <p:nvSpPr>
+          <p:cNvPr id="267" name="Google Shape;267;p38"/>
+          <p:cNvSpPr txBox="1"/>
+          <p:nvPr>
+            <p:ph idx="12" type="sldNum"/>
+          </p:nvPr>
+        </p:nvSpPr>
+        <p:spPr>
+          <a:xfrm>
+            <a:off x="8490250" y="4681009"/>
+            <a:ext cx="548700" cy="393600"/>
+          </a:xfrm>
+          <a:prstGeom prst="rect">
+            <a:avLst/>
+          </a:prstGeom>
+        </p:spPr>
+        <p:txBody>
+          <a:bodyPr anchorCtr="0" anchor="ctr" bIns="91425" lIns="91425" spcFirstLastPara="1" rIns="91425" wrap="square" tIns="91425">
+            <a:noAutofit/>
+          </a:bodyPr>
+          <a:lstStyle/>
+          <a:p>
+            <a:pPr indent="0" lvl="0" marL="0" rtl="0" algn="r">
+              <a:spcBef>
+                <a:spcPts val="0"/>
+              </a:spcBef>
+              <a:spcAft>
+                <a:spcPts val="0"/>
+              </a:spcAft>
+              <a:buNone/>
+            </a:pPr>
+            <a:fld id="{00000000-1234-1234-1234-123412341234}" type="slidenum">
+              <a:rPr lang="en"/>
+              <a:t>‹#›</a:t>
+            </a:fld>
+            <a:endParaRPr/>
+          </a:p>
+        </p:txBody>
+      </p:sp>
+      <p:sp>
+        <p:nvSpPr>
+          <p:cNvPr id="268" name="Google Shape;268;p38"/>
+          <p:cNvSpPr txBox="1"/>
+          <p:nvPr/>
+        </p:nvSpPr>
+        <p:spPr>
+          <a:xfrm>
+            <a:off x="224475" y="146400"/>
+            <a:ext cx="468600" cy="234300"/>
+          </a:xfrm>
+          <a:prstGeom prst="rect">
+            <a:avLst/>
+          </a:prstGeom>
+          <a:noFill/>
+          <a:ln>
+            <a:noFill/>
+          </a:ln>
+        </p:spPr>
+        <p:txBody>
+          <a:bodyPr anchorCtr="0" anchor="t" bIns="91425" lIns="91425" spcFirstLastPara="1" rIns="91425" wrap="square" tIns="91425">
+            <a:noAutofit/>
+          </a:bodyPr>
+          <a:lstStyle/>
+          <a:p>
+            <a:pPr indent="0" lvl="0" marL="0" rtl="0" algn="l">
+              <a:spcBef>
+                <a:spcPts val="0"/>
+              </a:spcBef>
+              <a:spcAft>
+                <a:spcPts val="0"/>
+              </a:spcAft>
+              <a:buNone/>
+            </a:pPr>
+            <a:r>
+              <a:rPr lang="en" sz="1800">
+                <a:solidFill>
+                  <a:srgbClr val="FFFFFF"/>
+                </a:solidFill>
+                <a:latin typeface="Average"/>
+                <a:ea typeface="Average"/>
+                <a:cs typeface="Average"/>
+                <a:sym typeface="Average"/>
+              </a:rPr>
+              <a:t>-3-</a:t>
+            </a:r>
+            <a:endParaRPr sz="1800">
+              <a:solidFill>
+                <a:srgbClr val="FFFFFF"/>
+              </a:solidFill>
+              <a:latin typeface="Average"/>
+              <a:ea typeface="Average"/>
+              <a:cs typeface="Average"/>
+              <a:sym typeface="Average"/>
+            </a:endParaRPr>
+          </a:p>
+        </p:txBody>
+      </p:sp>
+    </p:spTree>
+  </p:cSld>
+  <p:clrMapOvr>
+    <a:masterClrMapping/>
+  </p:clrMapOvr>
+</p:sld>
+</file>
+
+<file path=ppt/slides/slide27.xml><?xml version="1.0" encoding="utf-8"?>
+<p:sld xmlns:a="http://schemas.openxmlformats.org/drawingml/2006/main" xmlns:r="http://schemas.openxmlformats.org/officeDocument/2006/relationships" xmlns:mc="http://schemas.openxmlformats.org/markup-compatibility/2006" xmlns:mv="urn:schemas-microsoft-com:mac:vml" xmlns:p="http://schemas.openxmlformats.org/presentationml/2006/main" xmlns:c="http://schemas.openxmlformats.org/drawingml/2006/chart" xmlns:dgm="http://schemas.openxmlformats.org/drawingml/2006/diagram" xmlns:o="urn:schemas-microsoft-com:office:office" xmlns:v="urn:schemas-microsoft-com:vml" xmlns:pvml="urn:schemas-microsoft-com:office:powerpoint" xmlns:com="http://schemas.openxmlformats.org/drawingml/2006/compatibility" xmlns:p14="http://schemas.microsoft.com/office/powerpoint/2010/main" xmlns:p15="http://schemas.microsoft.com/office/powerpoint/2012/main">
+  <p:cSld>
+    <p:spTree>
+      <p:nvGrpSpPr>
+        <p:cNvPr id="272" name="Shape 272"/>
+        <p:cNvGrpSpPr/>
+        <p:nvPr/>
+      </p:nvGrpSpPr>
+      <p:grpSpPr>
+        <a:xfrm>
+          <a:off x="0" y="0"/>
+          <a:ext cx="0" cy="0"/>
+          <a:chOff x="0" y="0"/>
+          <a:chExt cx="0" cy="0"/>
+        </a:xfrm>
+      </p:grpSpPr>
+      <p:sp>
+        <p:nvSpPr>
+          <p:cNvPr id="273" name="Google Shape;273;p39"/>
+          <p:cNvSpPr txBox="1"/>
+          <p:nvPr>
+            <p:ph type="title"/>
+          </p:nvPr>
+        </p:nvSpPr>
+        <p:spPr>
+          <a:xfrm>
+            <a:off x="671250" y="2141250"/>
+            <a:ext cx="7852200" cy="861000"/>
+          </a:xfrm>
+          <a:prstGeom prst="rect">
+            <a:avLst/>
+          </a:prstGeom>
+        </p:spPr>
+        <p:txBody>
+          <a:bodyPr anchorCtr="0" anchor="ctr" bIns="91425" lIns="91425" spcFirstLastPara="1" rIns="91425" wrap="square" tIns="91425">
+            <a:noAutofit/>
+          </a:bodyPr>
+          <a:lstStyle/>
+          <a:p>
+            <a:pPr indent="0" lvl="0" marL="0" rtl="0" algn="ctr">
+              <a:spcBef>
+                <a:spcPts val="0"/>
+              </a:spcBef>
+              <a:spcAft>
+                <a:spcPts val="0"/>
+              </a:spcAft>
+              <a:buNone/>
+            </a:pPr>
+            <a:r>
+              <a:rPr lang="en"/>
+              <a:t>Switches</a:t>
+            </a:r>
+            <a:endParaRPr/>
+          </a:p>
+        </p:txBody>
+      </p:sp>
+      <p:sp>
+        <p:nvSpPr>
+          <p:cNvPr id="274" name="Google Shape;274;p39"/>
+          <p:cNvSpPr txBox="1"/>
+          <p:nvPr>
+            <p:ph idx="12" type="sldNum"/>
+          </p:nvPr>
+        </p:nvSpPr>
+        <p:spPr>
+          <a:xfrm>
+            <a:off x="8490250" y="4681009"/>
+            <a:ext cx="548700" cy="393600"/>
+          </a:xfrm>
+          <a:prstGeom prst="rect">
+            <a:avLst/>
+          </a:prstGeom>
+        </p:spPr>
+        <p:txBody>
+          <a:bodyPr anchorCtr="0" anchor="ctr" bIns="91425" lIns="91425" spcFirstLastPara="1" rIns="91425" wrap="square" tIns="91425">
+            <a:noAutofit/>
+          </a:bodyPr>
+          <a:lstStyle/>
+          <a:p>
+            <a:pPr indent="0" lvl="0" marL="0" rtl="0" algn="r">
+              <a:spcBef>
+                <a:spcPts val="0"/>
+              </a:spcBef>
+              <a:spcAft>
+                <a:spcPts val="0"/>
+              </a:spcAft>
+              <a:buNone/>
+            </a:pPr>
+            <a:fld id="{00000000-1234-1234-1234-123412341234}" type="slidenum">
+              <a:rPr lang="en"/>
+              <a:t>‹#›</a:t>
+            </a:fld>
+            <a:endParaRPr/>
+          </a:p>
+        </p:txBody>
+      </p:sp>
+      <p:sp>
+        <p:nvSpPr>
+          <p:cNvPr id="275" name="Google Shape;275;p39"/>
+          <p:cNvSpPr txBox="1"/>
+          <p:nvPr/>
+        </p:nvSpPr>
+        <p:spPr>
+          <a:xfrm>
+            <a:off x="224475" y="146400"/>
+            <a:ext cx="468600" cy="234300"/>
+          </a:xfrm>
+          <a:prstGeom prst="rect">
+            <a:avLst/>
+          </a:prstGeom>
+          <a:noFill/>
+          <a:ln>
+            <a:noFill/>
+          </a:ln>
+        </p:spPr>
+        <p:txBody>
+          <a:bodyPr anchorCtr="0" anchor="t" bIns="91425" lIns="91425" spcFirstLastPara="1" rIns="91425" wrap="square" tIns="91425">
+            <a:noAutofit/>
+          </a:bodyPr>
+          <a:lstStyle/>
+          <a:p>
+            <a:pPr indent="0" lvl="0" marL="0" rtl="0" algn="l">
+              <a:spcBef>
+                <a:spcPts val="0"/>
+              </a:spcBef>
+              <a:spcAft>
+                <a:spcPts val="0"/>
+              </a:spcAft>
+              <a:buNone/>
+            </a:pPr>
+            <a:r>
+              <a:rPr lang="en" sz="1800">
+                <a:solidFill>
+                  <a:srgbClr val="FFFFFF"/>
+                </a:solidFill>
+                <a:latin typeface="Average"/>
+                <a:ea typeface="Average"/>
+                <a:cs typeface="Average"/>
+                <a:sym typeface="Average"/>
+              </a:rPr>
+              <a:t>-3-</a:t>
+            </a:r>
+            <a:endParaRPr sz="1800">
+              <a:solidFill>
+                <a:srgbClr val="FFFFFF"/>
+              </a:solidFill>
+              <a:latin typeface="Average"/>
+              <a:ea typeface="Average"/>
+              <a:cs typeface="Average"/>
+              <a:sym typeface="Average"/>
+            </a:endParaRPr>
+          </a:p>
+        </p:txBody>
+      </p:sp>
+    </p:spTree>
+  </p:cSld>
+  <p:clrMapOvr>
+    <a:masterClrMapping/>
+  </p:clrMapOvr>
+</p:sld>
+</file>
+
+<file path=ppt/slides/slide28.xml><?xml version="1.0" encoding="utf-8"?>
+<p:sld xmlns:a="http://schemas.openxmlformats.org/drawingml/2006/main" xmlns:r="http://schemas.openxmlformats.org/officeDocument/2006/relationships" xmlns:mc="http://schemas.openxmlformats.org/markup-compatibility/2006" xmlns:mv="urn:schemas-microsoft-com:mac:vml" xmlns:p="http://schemas.openxmlformats.org/presentationml/2006/main" xmlns:c="http://schemas.openxmlformats.org/drawingml/2006/chart" xmlns:dgm="http://schemas.openxmlformats.org/drawingml/2006/diagram" xmlns:o="urn:schemas-microsoft-com:office:office" xmlns:v="urn:schemas-microsoft-com:vml" xmlns:pvml="urn:schemas-microsoft-com:office:powerpoint" xmlns:com="http://schemas.openxmlformats.org/drawingml/2006/compatibility" xmlns:p14="http://schemas.microsoft.com/office/powerpoint/2010/main" xmlns:p15="http://schemas.microsoft.com/office/powerpoint/2012/main">
+  <p:cSld>
+    <p:spTree>
+      <p:nvGrpSpPr>
+        <p:cNvPr id="279" name="Shape 279"/>
+        <p:cNvGrpSpPr/>
+        <p:nvPr/>
+      </p:nvGrpSpPr>
+      <p:grpSpPr>
+        <a:xfrm>
+          <a:off x="0" y="0"/>
+          <a:ext cx="0" cy="0"/>
+          <a:chOff x="0" y="0"/>
+          <a:chExt cx="0" cy="0"/>
+        </a:xfrm>
+      </p:grpSpPr>
+      <p:sp>
+        <p:nvSpPr>
+          <p:cNvPr id="280" name="Google Shape;280;p40"/>
+          <p:cNvSpPr txBox="1"/>
+          <p:nvPr>
+            <p:ph type="title"/>
+          </p:nvPr>
+        </p:nvSpPr>
+        <p:spPr>
+          <a:xfrm>
+            <a:off x="671250" y="2141250"/>
+            <a:ext cx="7852200" cy="861000"/>
+          </a:xfrm>
+          <a:prstGeom prst="rect">
+            <a:avLst/>
+          </a:prstGeom>
+        </p:spPr>
+        <p:txBody>
+          <a:bodyPr anchorCtr="0" anchor="ctr" bIns="91425" lIns="91425" spcFirstLastPara="1" rIns="91425" wrap="square" tIns="91425">
+            <a:noAutofit/>
+          </a:bodyPr>
+          <a:lstStyle/>
+          <a:p>
+            <a:pPr indent="0" lvl="0" marL="0" rtl="0" algn="ctr">
+              <a:spcBef>
+                <a:spcPts val="0"/>
+              </a:spcBef>
+              <a:spcAft>
+                <a:spcPts val="0"/>
+              </a:spcAft>
+              <a:buNone/>
+            </a:pPr>
+            <a:r>
+              <a:rPr lang="en"/>
+              <a:t>Functions</a:t>
+            </a:r>
+            <a:endParaRPr/>
+          </a:p>
+        </p:txBody>
+      </p:sp>
+      <p:sp>
+        <p:nvSpPr>
+          <p:cNvPr id="281" name="Google Shape;281;p40"/>
+          <p:cNvSpPr txBox="1"/>
+          <p:nvPr>
+            <p:ph idx="12" type="sldNum"/>
+          </p:nvPr>
+        </p:nvSpPr>
+        <p:spPr>
+          <a:xfrm>
+            <a:off x="8490250" y="4681009"/>
+            <a:ext cx="548700" cy="393600"/>
+          </a:xfrm>
+          <a:prstGeom prst="rect">
+            <a:avLst/>
+          </a:prstGeom>
+        </p:spPr>
+        <p:txBody>
+          <a:bodyPr anchorCtr="0" anchor="ctr" bIns="91425" lIns="91425" spcFirstLastPara="1" rIns="91425" wrap="square" tIns="91425">
+            <a:noAutofit/>
+          </a:bodyPr>
+          <a:lstStyle/>
+          <a:p>
+            <a:pPr indent="0" lvl="0" marL="0" rtl="0" algn="r">
+              <a:spcBef>
+                <a:spcPts val="0"/>
+              </a:spcBef>
+              <a:spcAft>
+                <a:spcPts val="0"/>
+              </a:spcAft>
+              <a:buNone/>
+            </a:pPr>
+            <a:fld id="{00000000-1234-1234-1234-123412341234}" type="slidenum">
+              <a:rPr lang="en"/>
+              <a:t>‹#›</a:t>
+            </a:fld>
+            <a:endParaRPr/>
+          </a:p>
+        </p:txBody>
+      </p:sp>
+      <p:sp>
+        <p:nvSpPr>
+          <p:cNvPr id="282" name="Google Shape;282;p40"/>
+          <p:cNvSpPr txBox="1"/>
+          <p:nvPr/>
+        </p:nvSpPr>
+        <p:spPr>
+          <a:xfrm>
+            <a:off x="224475" y="146400"/>
+            <a:ext cx="468600" cy="234300"/>
+          </a:xfrm>
+          <a:prstGeom prst="rect">
+            <a:avLst/>
+          </a:prstGeom>
+          <a:noFill/>
+          <a:ln>
+            <a:noFill/>
+          </a:ln>
+        </p:spPr>
+        <p:txBody>
+          <a:bodyPr anchorCtr="0" anchor="t" bIns="91425" lIns="91425" spcFirstLastPara="1" rIns="91425" wrap="square" tIns="91425">
+            <a:noAutofit/>
+          </a:bodyPr>
+          <a:lstStyle/>
+          <a:p>
+            <a:pPr indent="0" lvl="0" marL="0" rtl="0" algn="l">
+              <a:spcBef>
+                <a:spcPts val="0"/>
+              </a:spcBef>
+              <a:spcAft>
+                <a:spcPts val="0"/>
+              </a:spcAft>
+              <a:buNone/>
+            </a:pPr>
+            <a:r>
+              <a:rPr lang="en" sz="1800">
+                <a:solidFill>
+                  <a:srgbClr val="FFFFFF"/>
+                </a:solidFill>
+                <a:latin typeface="Average"/>
+                <a:ea typeface="Average"/>
+                <a:cs typeface="Average"/>
+                <a:sym typeface="Average"/>
+              </a:rPr>
+              <a:t>-3-</a:t>
+            </a:r>
+            <a:endParaRPr sz="1800">
+              <a:solidFill>
+                <a:srgbClr val="FFFFFF"/>
+              </a:solidFill>
+              <a:latin typeface="Average"/>
+              <a:ea typeface="Average"/>
+              <a:cs typeface="Average"/>
+              <a:sym typeface="Average"/>
+            </a:endParaRPr>
+          </a:p>
+        </p:txBody>
+      </p:sp>
+    </p:spTree>
+  </p:cSld>
+  <p:clrMapOvr>
+    <a:masterClrMapping/>
+  </p:clrMapOvr>
+</p:sld>
+</file>
+
+<file path=ppt/slides/slide29.xml><?xml version="1.0" encoding="utf-8"?>
+<p:sld xmlns:a="http://schemas.openxmlformats.org/drawingml/2006/main" xmlns:r="http://schemas.openxmlformats.org/officeDocument/2006/relationships" xmlns:mc="http://schemas.openxmlformats.org/markup-compatibility/2006" xmlns:mv="urn:schemas-microsoft-com:mac:vml" xmlns:p="http://schemas.openxmlformats.org/presentationml/2006/main" xmlns:c="http://schemas.openxmlformats.org/drawingml/2006/chart" xmlns:dgm="http://schemas.openxmlformats.org/drawingml/2006/diagram" xmlns:o="urn:schemas-microsoft-com:office:office" xmlns:v="urn:schemas-microsoft-com:vml" xmlns:pvml="urn:schemas-microsoft-com:office:powerpoint" xmlns:com="http://schemas.openxmlformats.org/drawingml/2006/compatibility" xmlns:p14="http://schemas.microsoft.com/office/powerpoint/2010/main" xmlns:p15="http://schemas.microsoft.com/office/powerpoint/2012/main">
+  <p:cSld>
+    <p:spTree>
+      <p:nvGrpSpPr>
+        <p:cNvPr id="286" name="Shape 286"/>
+        <p:cNvGrpSpPr/>
+        <p:nvPr/>
+      </p:nvGrpSpPr>
+      <p:grpSpPr>
+        <a:xfrm>
+          <a:off x="0" y="0"/>
+          <a:ext cx="0" cy="0"/>
+          <a:chOff x="0" y="0"/>
+          <a:chExt cx="0" cy="0"/>
+        </a:xfrm>
+      </p:grpSpPr>
+      <p:sp>
+        <p:nvSpPr>
+          <p:cNvPr id="287" name="Google Shape;287;p41"/>
+          <p:cNvSpPr txBox="1"/>
+          <p:nvPr>
+            <p:ph type="title"/>
+          </p:nvPr>
+        </p:nvSpPr>
+        <p:spPr>
+          <a:xfrm>
+            <a:off x="671250" y="2141250"/>
+            <a:ext cx="7852200" cy="861000"/>
+          </a:xfrm>
+          <a:prstGeom prst="rect">
+            <a:avLst/>
+          </a:prstGeom>
+        </p:spPr>
+        <p:txBody>
+          <a:bodyPr anchorCtr="0" anchor="ctr" bIns="91425" lIns="91425" spcFirstLastPara="1" rIns="91425" wrap="square" tIns="91425">
+            <a:noAutofit/>
+          </a:bodyPr>
+          <a:lstStyle/>
+          <a:p>
+            <a:pPr indent="0" lvl="0" marL="0" rtl="0" algn="ctr">
+              <a:spcBef>
+                <a:spcPts val="0"/>
+              </a:spcBef>
+              <a:spcAft>
+                <a:spcPts val="0"/>
+              </a:spcAft>
+              <a:buNone/>
+            </a:pPr>
+            <a:r>
+              <a:rPr lang="en"/>
+              <a:t>Loops</a:t>
+            </a:r>
+            <a:endParaRPr/>
+          </a:p>
+        </p:txBody>
+      </p:sp>
+      <p:sp>
+        <p:nvSpPr>
+          <p:cNvPr id="288" name="Google Shape;288;p41"/>
+          <p:cNvSpPr txBox="1"/>
+          <p:nvPr>
+            <p:ph idx="12" type="sldNum"/>
+          </p:nvPr>
+        </p:nvSpPr>
+        <p:spPr>
+          <a:xfrm>
+            <a:off x="8490250" y="4681009"/>
+            <a:ext cx="548700" cy="393600"/>
+          </a:xfrm>
+          <a:prstGeom prst="rect">
+            <a:avLst/>
+          </a:prstGeom>
+        </p:spPr>
+        <p:txBody>
+          <a:bodyPr anchorCtr="0" anchor="ctr" bIns="91425" lIns="91425" spcFirstLastPara="1" rIns="91425" wrap="square" tIns="91425">
+            <a:noAutofit/>
+          </a:bodyPr>
+          <a:lstStyle/>
+          <a:p>
+            <a:pPr indent="0" lvl="0" marL="0" rtl="0" algn="r">
+              <a:spcBef>
+                <a:spcPts val="0"/>
+              </a:spcBef>
+              <a:spcAft>
+                <a:spcPts val="0"/>
+              </a:spcAft>
+              <a:buNone/>
+            </a:pPr>
+            <a:fld id="{00000000-1234-1234-1234-123412341234}" type="slidenum">
+              <a:rPr lang="en"/>
+              <a:t>‹#›</a:t>
+            </a:fld>
+            <a:endParaRPr/>
+          </a:p>
+        </p:txBody>
+      </p:sp>
+      <p:sp>
+        <p:nvSpPr>
+          <p:cNvPr id="289" name="Google Shape;289;p41"/>
+          <p:cNvSpPr txBox="1"/>
+          <p:nvPr/>
+        </p:nvSpPr>
+        <p:spPr>
+          <a:xfrm>
+            <a:off x="224475" y="146400"/>
+            <a:ext cx="468600" cy="234300"/>
+          </a:xfrm>
+          <a:prstGeom prst="rect">
+            <a:avLst/>
+          </a:prstGeom>
+          <a:noFill/>
+          <a:ln>
+            <a:noFill/>
+          </a:ln>
+        </p:spPr>
+        <p:txBody>
+          <a:bodyPr anchorCtr="0" anchor="t" bIns="91425" lIns="91425" spcFirstLastPara="1" rIns="91425" wrap="square" tIns="91425">
+            <a:noAutofit/>
+          </a:bodyPr>
+          <a:lstStyle/>
+          <a:p>
+            <a:pPr indent="0" lvl="0" marL="0" rtl="0" algn="l">
+              <a:spcBef>
+                <a:spcPts val="0"/>
+              </a:spcBef>
+              <a:spcAft>
+                <a:spcPts val="0"/>
+              </a:spcAft>
+              <a:buNone/>
+            </a:pPr>
+            <a:r>
+              <a:rPr lang="en" sz="1800">
+                <a:solidFill>
+                  <a:srgbClr val="FFFFFF"/>
+                </a:solidFill>
+                <a:latin typeface="Average"/>
+                <a:ea typeface="Average"/>
+                <a:cs typeface="Average"/>
+                <a:sym typeface="Average"/>
+              </a:rPr>
+              <a:t>-3-</a:t>
+            </a:r>
+            <a:endParaRPr sz="1800">
+              <a:solidFill>
+                <a:srgbClr val="FFFFFF"/>
+              </a:solidFill>
+              <a:latin typeface="Average"/>
+              <a:ea typeface="Average"/>
+              <a:cs typeface="Average"/>
+              <a:sym typeface="Average"/>
+            </a:endParaRPr>
+          </a:p>
+        </p:txBody>
+      </p:sp>
+    </p:spTree>
+  </p:cSld>
+  <p:clrMapOvr>
+    <a:masterClrMapping/>
+  </p:clrMapOvr>
+</p:sld>
+</file>
+
 <file path=ppt/slides/slide3.xml><?xml version="1.0" encoding="utf-8"?>
 <p:sld xmlns:a="http://schemas.openxmlformats.org/drawingml/2006/main" xmlns:r="http://schemas.openxmlformats.org/officeDocument/2006/relationships" xmlns:mc="http://schemas.openxmlformats.org/markup-compatibility/2006" xmlns:mv="urn:schemas-microsoft-com:mac:vml" xmlns:p="http://schemas.openxmlformats.org/presentationml/2006/main" xmlns:c="http://schemas.openxmlformats.org/drawingml/2006/chart" xmlns:dgm="http://schemas.openxmlformats.org/drawingml/2006/diagram" xmlns:o="urn:schemas-microsoft-com:office:office" xmlns:v="urn:schemas-microsoft-com:vml" xmlns:pvml="urn:schemas-microsoft-com:office:powerpoint" xmlns:com="http://schemas.openxmlformats.org/drawingml/2006/compatibility" xmlns:p14="http://schemas.microsoft.com/office/powerpoint/2010/main" xmlns:p15="http://schemas.microsoft.com/office/powerpoint/2012/main">
   <p:cSld>
@@ -14084,6 +15340,332 @@
               <a:t>Brendan Ike in 1995</a:t>
             </a:r>
             <a:endParaRPr>
+              <a:latin typeface="Average"/>
+              <a:ea typeface="Average"/>
+              <a:cs typeface="Average"/>
+              <a:sym typeface="Average"/>
+            </a:endParaRPr>
+          </a:p>
+        </p:txBody>
+      </p:sp>
+    </p:spTree>
+  </p:cSld>
+  <p:clrMapOvr>
+    <a:masterClrMapping/>
+  </p:clrMapOvr>
+</p:sld>
+</file>
+
+<file path=ppt/slides/slide30.xml><?xml version="1.0" encoding="utf-8"?>
+<p:sld xmlns:a="http://schemas.openxmlformats.org/drawingml/2006/main" xmlns:r="http://schemas.openxmlformats.org/officeDocument/2006/relationships" xmlns:mc="http://schemas.openxmlformats.org/markup-compatibility/2006" xmlns:mv="urn:schemas-microsoft-com:mac:vml" xmlns:p="http://schemas.openxmlformats.org/presentationml/2006/main" xmlns:c="http://schemas.openxmlformats.org/drawingml/2006/chart" xmlns:dgm="http://schemas.openxmlformats.org/drawingml/2006/diagram" xmlns:o="urn:schemas-microsoft-com:office:office" xmlns:v="urn:schemas-microsoft-com:vml" xmlns:pvml="urn:schemas-microsoft-com:office:powerpoint" xmlns:com="http://schemas.openxmlformats.org/drawingml/2006/compatibility" xmlns:p14="http://schemas.microsoft.com/office/powerpoint/2010/main" xmlns:p15="http://schemas.microsoft.com/office/powerpoint/2012/main">
+  <p:cSld>
+    <p:spTree>
+      <p:nvGrpSpPr>
+        <p:cNvPr id="293" name="Shape 293"/>
+        <p:cNvGrpSpPr/>
+        <p:nvPr/>
+      </p:nvGrpSpPr>
+      <p:grpSpPr>
+        <a:xfrm>
+          <a:off x="0" y="0"/>
+          <a:ext cx="0" cy="0"/>
+          <a:chOff x="0" y="0"/>
+          <a:chExt cx="0" cy="0"/>
+        </a:xfrm>
+      </p:grpSpPr>
+      <p:sp>
+        <p:nvSpPr>
+          <p:cNvPr id="294" name="Google Shape;294;p42"/>
+          <p:cNvSpPr txBox="1"/>
+          <p:nvPr>
+            <p:ph type="title"/>
+          </p:nvPr>
+        </p:nvSpPr>
+        <p:spPr>
+          <a:xfrm>
+            <a:off x="671250" y="2141250"/>
+            <a:ext cx="7852200" cy="861000"/>
+          </a:xfrm>
+          <a:prstGeom prst="rect">
+            <a:avLst/>
+          </a:prstGeom>
+        </p:spPr>
+        <p:txBody>
+          <a:bodyPr anchorCtr="0" anchor="ctr" bIns="91425" lIns="91425" spcFirstLastPara="1" rIns="91425" wrap="square" tIns="91425">
+            <a:noAutofit/>
+          </a:bodyPr>
+          <a:lstStyle/>
+          <a:p>
+            <a:pPr indent="0" lvl="0" marL="0" rtl="0" algn="ctr">
+              <a:spcBef>
+                <a:spcPts val="0"/>
+              </a:spcBef>
+              <a:spcAft>
+                <a:spcPts val="0"/>
+              </a:spcAft>
+              <a:buNone/>
+            </a:pPr>
+            <a:r>
+              <a:rPr lang="en"/>
+              <a:t>Window Object</a:t>
+            </a:r>
+            <a:endParaRPr/>
+          </a:p>
+        </p:txBody>
+      </p:sp>
+      <p:sp>
+        <p:nvSpPr>
+          <p:cNvPr id="295" name="Google Shape;295;p42"/>
+          <p:cNvSpPr txBox="1"/>
+          <p:nvPr>
+            <p:ph idx="12" type="sldNum"/>
+          </p:nvPr>
+        </p:nvSpPr>
+        <p:spPr>
+          <a:xfrm>
+            <a:off x="8490250" y="4681009"/>
+            <a:ext cx="548700" cy="393600"/>
+          </a:xfrm>
+          <a:prstGeom prst="rect">
+            <a:avLst/>
+          </a:prstGeom>
+        </p:spPr>
+        <p:txBody>
+          <a:bodyPr anchorCtr="0" anchor="ctr" bIns="91425" lIns="91425" spcFirstLastPara="1" rIns="91425" wrap="square" tIns="91425">
+            <a:noAutofit/>
+          </a:bodyPr>
+          <a:lstStyle/>
+          <a:p>
+            <a:pPr indent="0" lvl="0" marL="0" rtl="0" algn="r">
+              <a:spcBef>
+                <a:spcPts val="0"/>
+              </a:spcBef>
+              <a:spcAft>
+                <a:spcPts val="0"/>
+              </a:spcAft>
+              <a:buNone/>
+            </a:pPr>
+            <a:fld id="{00000000-1234-1234-1234-123412341234}" type="slidenum">
+              <a:rPr lang="en"/>
+              <a:t>‹#›</a:t>
+            </a:fld>
+            <a:endParaRPr/>
+          </a:p>
+        </p:txBody>
+      </p:sp>
+      <p:sp>
+        <p:nvSpPr>
+          <p:cNvPr id="296" name="Google Shape;296;p42"/>
+          <p:cNvSpPr txBox="1"/>
+          <p:nvPr/>
+        </p:nvSpPr>
+        <p:spPr>
+          <a:xfrm>
+            <a:off x="224475" y="146400"/>
+            <a:ext cx="468600" cy="234300"/>
+          </a:xfrm>
+          <a:prstGeom prst="rect">
+            <a:avLst/>
+          </a:prstGeom>
+          <a:noFill/>
+          <a:ln>
+            <a:noFill/>
+          </a:ln>
+        </p:spPr>
+        <p:txBody>
+          <a:bodyPr anchorCtr="0" anchor="t" bIns="91425" lIns="91425" spcFirstLastPara="1" rIns="91425" wrap="square" tIns="91425">
+            <a:noAutofit/>
+          </a:bodyPr>
+          <a:lstStyle/>
+          <a:p>
+            <a:pPr indent="0" lvl="0" marL="0" rtl="0" algn="l">
+              <a:spcBef>
+                <a:spcPts val="0"/>
+              </a:spcBef>
+              <a:spcAft>
+                <a:spcPts val="0"/>
+              </a:spcAft>
+              <a:buNone/>
+            </a:pPr>
+            <a:r>
+              <a:rPr lang="en" sz="1800">
+                <a:solidFill>
+                  <a:srgbClr val="FFFFFF"/>
+                </a:solidFill>
+                <a:latin typeface="Average"/>
+                <a:ea typeface="Average"/>
+                <a:cs typeface="Average"/>
+                <a:sym typeface="Average"/>
+              </a:rPr>
+              <a:t>-3-</a:t>
+            </a:r>
+            <a:endParaRPr sz="1800">
+              <a:solidFill>
+                <a:srgbClr val="FFFFFF"/>
+              </a:solidFill>
+              <a:latin typeface="Average"/>
+              <a:ea typeface="Average"/>
+              <a:cs typeface="Average"/>
+              <a:sym typeface="Average"/>
+            </a:endParaRPr>
+          </a:p>
+        </p:txBody>
+      </p:sp>
+    </p:spTree>
+  </p:cSld>
+  <p:clrMapOvr>
+    <a:masterClrMapping/>
+  </p:clrMapOvr>
+</p:sld>
+</file>
+
+<file path=ppt/slides/slide31.xml><?xml version="1.0" encoding="utf-8"?>
+<p:sld xmlns:a="http://schemas.openxmlformats.org/drawingml/2006/main" xmlns:r="http://schemas.openxmlformats.org/officeDocument/2006/relationships" xmlns:mc="http://schemas.openxmlformats.org/markup-compatibility/2006" xmlns:mv="urn:schemas-microsoft-com:mac:vml" xmlns:p="http://schemas.openxmlformats.org/presentationml/2006/main" xmlns:c="http://schemas.openxmlformats.org/drawingml/2006/chart" xmlns:dgm="http://schemas.openxmlformats.org/drawingml/2006/diagram" xmlns:o="urn:schemas-microsoft-com:office:office" xmlns:v="urn:schemas-microsoft-com:vml" xmlns:pvml="urn:schemas-microsoft-com:office:powerpoint" xmlns:com="http://schemas.openxmlformats.org/drawingml/2006/compatibility" xmlns:p14="http://schemas.microsoft.com/office/powerpoint/2010/main" xmlns:p15="http://schemas.microsoft.com/office/powerpoint/2012/main">
+  <p:cSld>
+    <p:spTree>
+      <p:nvGrpSpPr>
+        <p:cNvPr id="300" name="Shape 300"/>
+        <p:cNvGrpSpPr/>
+        <p:nvPr/>
+      </p:nvGrpSpPr>
+      <p:grpSpPr>
+        <a:xfrm>
+          <a:off x="0" y="0"/>
+          <a:ext cx="0" cy="0"/>
+          <a:chOff x="0" y="0"/>
+          <a:chExt cx="0" cy="0"/>
+        </a:xfrm>
+      </p:grpSpPr>
+      <p:sp>
+        <p:nvSpPr>
+          <p:cNvPr id="301" name="Google Shape;301;p43"/>
+          <p:cNvSpPr txBox="1"/>
+          <p:nvPr>
+            <p:ph type="title"/>
+          </p:nvPr>
+        </p:nvSpPr>
+        <p:spPr>
+          <a:xfrm>
+            <a:off x="671250" y="2141250"/>
+            <a:ext cx="7852200" cy="861000"/>
+          </a:xfrm>
+          <a:prstGeom prst="rect">
+            <a:avLst/>
+          </a:prstGeom>
+        </p:spPr>
+        <p:txBody>
+          <a:bodyPr anchorCtr="0" anchor="ctr" bIns="91425" lIns="91425" spcFirstLastPara="1" rIns="91425" wrap="square" tIns="91425">
+            <a:noAutofit/>
+          </a:bodyPr>
+          <a:lstStyle/>
+          <a:p>
+            <a:pPr indent="0" lvl="0" marL="0" rtl="0" algn="ctr">
+              <a:spcBef>
+                <a:spcPts val="0"/>
+              </a:spcBef>
+              <a:spcAft>
+                <a:spcPts val="0"/>
+              </a:spcAft>
+              <a:buNone/>
+            </a:pPr>
+            <a:r>
+              <a:rPr lang="en"/>
+              <a:t>Block Scope</a:t>
+            </a:r>
+            <a:endParaRPr/>
+          </a:p>
+        </p:txBody>
+      </p:sp>
+      <p:sp>
+        <p:nvSpPr>
+          <p:cNvPr id="302" name="Google Shape;302;p43"/>
+          <p:cNvSpPr txBox="1"/>
+          <p:nvPr>
+            <p:ph idx="12" type="sldNum"/>
+          </p:nvPr>
+        </p:nvSpPr>
+        <p:spPr>
+          <a:xfrm>
+            <a:off x="8490250" y="4681009"/>
+            <a:ext cx="548700" cy="393600"/>
+          </a:xfrm>
+          <a:prstGeom prst="rect">
+            <a:avLst/>
+          </a:prstGeom>
+        </p:spPr>
+        <p:txBody>
+          <a:bodyPr anchorCtr="0" anchor="ctr" bIns="91425" lIns="91425" spcFirstLastPara="1" rIns="91425" wrap="square" tIns="91425">
+            <a:noAutofit/>
+          </a:bodyPr>
+          <a:lstStyle/>
+          <a:p>
+            <a:pPr indent="0" lvl="0" marL="0" rtl="0" algn="r">
+              <a:spcBef>
+                <a:spcPts val="0"/>
+              </a:spcBef>
+              <a:spcAft>
+                <a:spcPts val="0"/>
+              </a:spcAft>
+              <a:buNone/>
+            </a:pPr>
+            <a:fld id="{00000000-1234-1234-1234-123412341234}" type="slidenum">
+              <a:rPr lang="en"/>
+              <a:t>‹#›</a:t>
+            </a:fld>
+            <a:endParaRPr/>
+          </a:p>
+        </p:txBody>
+      </p:sp>
+      <p:sp>
+        <p:nvSpPr>
+          <p:cNvPr id="303" name="Google Shape;303;p43"/>
+          <p:cNvSpPr txBox="1"/>
+          <p:nvPr/>
+        </p:nvSpPr>
+        <p:spPr>
+          <a:xfrm>
+            <a:off x="224475" y="146400"/>
+            <a:ext cx="468600" cy="234300"/>
+          </a:xfrm>
+          <a:prstGeom prst="rect">
+            <a:avLst/>
+          </a:prstGeom>
+          <a:noFill/>
+          <a:ln>
+            <a:noFill/>
+          </a:ln>
+        </p:spPr>
+        <p:txBody>
+          <a:bodyPr anchorCtr="0" anchor="t" bIns="91425" lIns="91425" spcFirstLastPara="1" rIns="91425" wrap="square" tIns="91425">
+            <a:noAutofit/>
+          </a:bodyPr>
+          <a:lstStyle/>
+          <a:p>
+            <a:pPr indent="0" lvl="0" marL="0" rtl="0" algn="l">
+              <a:spcBef>
+                <a:spcPts val="0"/>
+              </a:spcBef>
+              <a:spcAft>
+                <a:spcPts val="0"/>
+              </a:spcAft>
+              <a:buNone/>
+            </a:pPr>
+            <a:r>
+              <a:rPr lang="en" sz="1800">
+                <a:solidFill>
+                  <a:srgbClr val="FFFFFF"/>
+                </a:solidFill>
+                <a:latin typeface="Average"/>
+                <a:ea typeface="Average"/>
+                <a:cs typeface="Average"/>
+                <a:sym typeface="Average"/>
+              </a:rPr>
+              <a:t>-3-</a:t>
+            </a:r>
+            <a:endParaRPr sz="1800">
+              <a:solidFill>
+                <a:srgbClr val="FFFFFF"/>
+              </a:solidFill>
               <a:latin typeface="Average"/>
               <a:ea typeface="Average"/>
               <a:cs typeface="Average"/>

</xml_diff>

<commit_message>
local storage and pptx
</commit_message>
<xml_diff>
--- a/2020-WebDev_js.pptx
+++ b/2020-WebDev_js.pptx
@@ -50,31 +50,30 @@
     <p:sldId id="295" r:id="rId45"/>
     <p:sldId id="296" r:id="rId46"/>
     <p:sldId id="297" r:id="rId47"/>
-    <p:sldId id="298" r:id="rId48"/>
   </p:sldIdLst>
   <p:sldSz cy="5143500" cx="9144000"/>
   <p:notesSz cx="6858000" cy="9144000"/>
   <p:embeddedFontLst>
     <p:embeddedFont>
       <p:font typeface="Roboto Slab"/>
-      <p:regular r:id="rId49"/>
-      <p:bold r:id="rId50"/>
+      <p:regular r:id="rId48"/>
+      <p:bold r:id="rId49"/>
     </p:embeddedFont>
     <p:embeddedFont>
       <p:font typeface="Raleway"/>
-      <p:regular r:id="rId51"/>
-      <p:bold r:id="rId52"/>
-      <p:italic r:id="rId53"/>
-      <p:boldItalic r:id="rId54"/>
+      <p:regular r:id="rId50"/>
+      <p:bold r:id="rId51"/>
+      <p:italic r:id="rId52"/>
+      <p:boldItalic r:id="rId53"/>
     </p:embeddedFont>
     <p:embeddedFont>
       <p:font typeface="Average"/>
-      <p:regular r:id="rId55"/>
+      <p:regular r:id="rId54"/>
     </p:embeddedFont>
     <p:embeddedFont>
       <p:font typeface="Oswald"/>
-      <p:regular r:id="rId56"/>
-      <p:bold r:id="rId57"/>
+      <p:regular r:id="rId55"/>
+      <p:bold r:id="rId56"/>
     </p:embeddedFont>
   </p:embeddedFontLst>
   <p:defaultTextStyle>
@@ -4334,7 +4333,7 @@
       </p:grpSpPr>
       <p:sp>
         <p:nvSpPr>
-          <p:cNvPr id="396" name="Google Shape;396;g7e3254e85e_0_80:notes"/>
+          <p:cNvPr id="396" name="Google Shape;396;g7e3254e85e_0_86:notes"/>
           <p:cNvSpPr/>
           <p:nvPr>
             <p:ph idx="2" type="sldImg"/>
@@ -4369,106 +4368,7 @@
       </p:sp>
       <p:sp>
         <p:nvSpPr>
-          <p:cNvPr id="397" name="Google Shape;397;g7e3254e85e_0_80:notes"/>
-          <p:cNvSpPr txBox="1"/>
-          <p:nvPr>
-            <p:ph idx="1" type="body"/>
-          </p:nvPr>
-        </p:nvSpPr>
-        <p:spPr>
-          <a:xfrm>
-            <a:off x="685800" y="4343400"/>
-            <a:ext cx="5486400" cy="4114800"/>
-          </a:xfrm>
-          <a:prstGeom prst="rect">
-            <a:avLst/>
-          </a:prstGeom>
-        </p:spPr>
-        <p:txBody>
-          <a:bodyPr anchorCtr="0" anchor="t" bIns="91425" lIns="91425" spcFirstLastPara="1" rIns="91425" wrap="square" tIns="91425">
-            <a:noAutofit/>
-          </a:bodyPr>
-          <a:lstStyle/>
-          <a:p>
-            <a:pPr indent="0" lvl="0" marL="0" rtl="0" algn="l">
-              <a:spcBef>
-                <a:spcPts val="0"/>
-              </a:spcBef>
-              <a:spcAft>
-                <a:spcPts val="0"/>
-              </a:spcAft>
-              <a:buNone/>
-            </a:pPr>
-            <a:r>
-              <a:t/>
-            </a:r>
-            <a:endParaRPr/>
-          </a:p>
-        </p:txBody>
-      </p:sp>
-    </p:spTree>
-  </p:cSld>
-  <p:clrMapOvr>
-    <a:masterClrMapping/>
-  </p:clrMapOvr>
-</p:notes>
-</file>
-
-<file path=ppt/notesSlides/notesSlide43.xml><?xml version="1.0" encoding="utf-8"?>
-<p:notes xmlns:a="http://schemas.openxmlformats.org/drawingml/2006/main" xmlns:r="http://schemas.openxmlformats.org/officeDocument/2006/relationships" xmlns:mc="http://schemas.openxmlformats.org/markup-compatibility/2006" xmlns:mv="urn:schemas-microsoft-com:mac:vml" xmlns:p="http://schemas.openxmlformats.org/presentationml/2006/main" xmlns:c="http://schemas.openxmlformats.org/drawingml/2006/chart" xmlns:dgm="http://schemas.openxmlformats.org/drawingml/2006/diagram" xmlns:o="urn:schemas-microsoft-com:office:office" xmlns:v="urn:schemas-microsoft-com:vml" xmlns:pvml="urn:schemas-microsoft-com:office:powerpoint" xmlns:com="http://schemas.openxmlformats.org/drawingml/2006/compatibility" xmlns:p14="http://schemas.microsoft.com/office/powerpoint/2010/main" xmlns:p15="http://schemas.microsoft.com/office/powerpoint/2012/main" showMasterPhAnim="0" showMasterSp="0">
-  <p:cSld>
-    <p:spTree>
-      <p:nvGrpSpPr>
-        <p:cNvPr id="402" name="Shape 402"/>
-        <p:cNvGrpSpPr/>
-        <p:nvPr/>
-      </p:nvGrpSpPr>
-      <p:grpSpPr>
-        <a:xfrm>
-          <a:off x="0" y="0"/>
-          <a:ext cx="0" cy="0"/>
-          <a:chOff x="0" y="0"/>
-          <a:chExt cx="0" cy="0"/>
-        </a:xfrm>
-      </p:grpSpPr>
-      <p:sp>
-        <p:nvSpPr>
-          <p:cNvPr id="403" name="Google Shape;403;g7e3254e85e_0_86:notes"/>
-          <p:cNvSpPr/>
-          <p:nvPr>
-            <p:ph idx="2" type="sldImg"/>
-          </p:nvPr>
-        </p:nvSpPr>
-        <p:spPr>
-          <a:xfrm>
-            <a:off x="381300" y="685800"/>
-            <a:ext cx="6096000" cy="3429000"/>
-          </a:xfrm>
-          <a:custGeom>
-            <a:rect b="b" l="l" r="r" t="t"/>
-            <a:pathLst>
-              <a:path extrusionOk="0" h="120000" w="120000">
-                <a:moveTo>
-                  <a:pt x="0" y="0"/>
-                </a:moveTo>
-                <a:lnTo>
-                  <a:pt x="120000" y="0"/>
-                </a:lnTo>
-                <a:lnTo>
-                  <a:pt x="120000" y="120000"/>
-                </a:lnTo>
-                <a:lnTo>
-                  <a:pt x="0" y="120000"/>
-                </a:lnTo>
-                <a:close/>
-              </a:path>
-            </a:pathLst>
-          </a:custGeom>
-        </p:spPr>
-      </p:sp>
-      <p:sp>
-        <p:nvSpPr>
-          <p:cNvPr id="404" name="Google Shape;404;g7e3254e85e_0_86:notes"/>
+          <p:cNvPr id="397" name="Google Shape;397;g7e3254e85e_0_86:notes"/>
           <p:cNvSpPr txBox="1"/>
           <p:nvPr>
             <p:ph idx="1" type="body"/>
@@ -19991,15 +19891,7 @@
             </a:pPr>
             <a:r>
               <a:rPr lang="en"/>
-              <a:t>DOM - </a:t>
-            </a:r>
-            <a:r>
-              <a:rPr lang="en"/>
-              <a:t>Bubbling</a:t>
-            </a:r>
-            <a:r>
-              <a:rPr lang="en"/>
-              <a:t> &amp; Delegation</a:t>
+              <a:t>DOM - Local Session Storage</a:t>
             </a:r>
             <a:endParaRPr/>
           </a:p>
@@ -20048,169 +19940,6 @@
       <p:sp>
         <p:nvSpPr>
           <p:cNvPr id="401" name="Google Shape;401;p54"/>
-          <p:cNvSpPr txBox="1"/>
-          <p:nvPr/>
-        </p:nvSpPr>
-        <p:spPr>
-          <a:xfrm>
-            <a:off x="224475" y="146400"/>
-            <a:ext cx="468600" cy="234300"/>
-          </a:xfrm>
-          <a:prstGeom prst="rect">
-            <a:avLst/>
-          </a:prstGeom>
-          <a:noFill/>
-          <a:ln>
-            <a:noFill/>
-          </a:ln>
-        </p:spPr>
-        <p:txBody>
-          <a:bodyPr anchorCtr="0" anchor="t" bIns="91425" lIns="91425" spcFirstLastPara="1" rIns="91425" wrap="square" tIns="91425">
-            <a:noAutofit/>
-          </a:bodyPr>
-          <a:lstStyle/>
-          <a:p>
-            <a:pPr indent="0" lvl="0" marL="0" rtl="0" algn="l">
-              <a:spcBef>
-                <a:spcPts val="0"/>
-              </a:spcBef>
-              <a:spcAft>
-                <a:spcPts val="0"/>
-              </a:spcAft>
-              <a:buNone/>
-            </a:pPr>
-            <a:r>
-              <a:rPr lang="en" sz="1800">
-                <a:solidFill>
-                  <a:srgbClr val="FFFFFF"/>
-                </a:solidFill>
-                <a:latin typeface="Average"/>
-                <a:ea typeface="Average"/>
-                <a:cs typeface="Average"/>
-                <a:sym typeface="Average"/>
-              </a:rPr>
-              <a:t>-3-</a:t>
-            </a:r>
-            <a:endParaRPr sz="1800">
-              <a:solidFill>
-                <a:srgbClr val="FFFFFF"/>
-              </a:solidFill>
-              <a:latin typeface="Average"/>
-              <a:ea typeface="Average"/>
-              <a:cs typeface="Average"/>
-              <a:sym typeface="Average"/>
-            </a:endParaRPr>
-          </a:p>
-        </p:txBody>
-      </p:sp>
-    </p:spTree>
-  </p:cSld>
-  <p:clrMapOvr>
-    <a:masterClrMapping/>
-  </p:clrMapOvr>
-</p:sld>
-</file>
-
-<file path=ppt/slides/slide43.xml><?xml version="1.0" encoding="utf-8"?>
-<p:sld xmlns:a="http://schemas.openxmlformats.org/drawingml/2006/main" xmlns:r="http://schemas.openxmlformats.org/officeDocument/2006/relationships" xmlns:mc="http://schemas.openxmlformats.org/markup-compatibility/2006" xmlns:mv="urn:schemas-microsoft-com:mac:vml" xmlns:p="http://schemas.openxmlformats.org/presentationml/2006/main" xmlns:c="http://schemas.openxmlformats.org/drawingml/2006/chart" xmlns:dgm="http://schemas.openxmlformats.org/drawingml/2006/diagram" xmlns:o="urn:schemas-microsoft-com:office:office" xmlns:v="urn:schemas-microsoft-com:vml" xmlns:pvml="urn:schemas-microsoft-com:office:powerpoint" xmlns:com="http://schemas.openxmlformats.org/drawingml/2006/compatibility" xmlns:p14="http://schemas.microsoft.com/office/powerpoint/2010/main" xmlns:p15="http://schemas.microsoft.com/office/powerpoint/2012/main">
-  <p:cSld>
-    <p:spTree>
-      <p:nvGrpSpPr>
-        <p:cNvPr id="405" name="Shape 405"/>
-        <p:cNvGrpSpPr/>
-        <p:nvPr/>
-      </p:nvGrpSpPr>
-      <p:grpSpPr>
-        <a:xfrm>
-          <a:off x="0" y="0"/>
-          <a:ext cx="0" cy="0"/>
-          <a:chOff x="0" y="0"/>
-          <a:chExt cx="0" cy="0"/>
-        </a:xfrm>
-      </p:grpSpPr>
-      <p:sp>
-        <p:nvSpPr>
-          <p:cNvPr id="406" name="Google Shape;406;p55"/>
-          <p:cNvSpPr txBox="1"/>
-          <p:nvPr>
-            <p:ph type="title"/>
-          </p:nvPr>
-        </p:nvSpPr>
-        <p:spPr>
-          <a:xfrm>
-            <a:off x="671250" y="2141250"/>
-            <a:ext cx="7852200" cy="861000"/>
-          </a:xfrm>
-          <a:prstGeom prst="rect">
-            <a:avLst/>
-          </a:prstGeom>
-        </p:spPr>
-        <p:txBody>
-          <a:bodyPr anchorCtr="0" anchor="ctr" bIns="91425" lIns="91425" spcFirstLastPara="1" rIns="91425" wrap="square" tIns="91425">
-            <a:noAutofit/>
-          </a:bodyPr>
-          <a:lstStyle/>
-          <a:p>
-            <a:pPr indent="0" lvl="0" marL="0" rtl="0" algn="ctr">
-              <a:spcBef>
-                <a:spcPts val="0"/>
-              </a:spcBef>
-              <a:spcAft>
-                <a:spcPts val="0"/>
-              </a:spcAft>
-              <a:buNone/>
-            </a:pPr>
-            <a:r>
-              <a:rPr lang="en"/>
-              <a:t>DOM - Local Session Storage</a:t>
-            </a:r>
-            <a:endParaRPr/>
-          </a:p>
-        </p:txBody>
-      </p:sp>
-      <p:sp>
-        <p:nvSpPr>
-          <p:cNvPr id="407" name="Google Shape;407;p55"/>
-          <p:cNvSpPr txBox="1"/>
-          <p:nvPr>
-            <p:ph idx="12" type="sldNum"/>
-          </p:nvPr>
-        </p:nvSpPr>
-        <p:spPr>
-          <a:xfrm>
-            <a:off x="8490250" y="4681009"/>
-            <a:ext cx="548700" cy="393600"/>
-          </a:xfrm>
-          <a:prstGeom prst="rect">
-            <a:avLst/>
-          </a:prstGeom>
-        </p:spPr>
-        <p:txBody>
-          <a:bodyPr anchorCtr="0" anchor="ctr" bIns="91425" lIns="91425" spcFirstLastPara="1" rIns="91425" wrap="square" tIns="91425">
-            <a:noAutofit/>
-          </a:bodyPr>
-          <a:lstStyle/>
-          <a:p>
-            <a:pPr indent="0" lvl="0" marL="0" rtl="0" algn="r">
-              <a:spcBef>
-                <a:spcPts val="0"/>
-              </a:spcBef>
-              <a:spcAft>
-                <a:spcPts val="0"/>
-              </a:spcAft>
-              <a:buNone/>
-            </a:pPr>
-            <a:fld id="{00000000-1234-1234-1234-123412341234}" type="slidenum">
-              <a:rPr lang="en"/>
-              <a:t>‹#›</a:t>
-            </a:fld>
-            <a:endParaRPr/>
-          </a:p>
-        </p:txBody>
-      </p:sp>
-      <p:sp>
-        <p:nvSpPr>
-          <p:cNvPr id="408" name="Google Shape;408;p55"/>
           <p:cNvSpPr txBox="1"/>
           <p:nvPr/>
         </p:nvSpPr>
@@ -23715,6 +23444,285 @@
 </file>
 
 <file path=ppt/theme/theme1.xml><?xml version="1.0" encoding="utf-8"?>
+<a:theme xmlns:a="http://schemas.openxmlformats.org/drawingml/2006/main" xmlns:r="http://schemas.openxmlformats.org/officeDocument/2006/relationships" name="Slate">
+  <a:themeElements>
+    <a:clrScheme name="Slate">
+      <a:dk1>
+        <a:srgbClr val="FFFFFF"/>
+      </a:dk1>
+      <a:lt1>
+        <a:srgbClr val="37474F"/>
+      </a:lt1>
+      <a:dk2>
+        <a:srgbClr val="9E9E9E"/>
+      </a:dk2>
+      <a:lt2>
+        <a:srgbClr val="E0E0E0"/>
+      </a:lt2>
+      <a:accent1>
+        <a:srgbClr val="616161"/>
+      </a:accent1>
+      <a:accent2>
+        <a:srgbClr val="78909C"/>
+      </a:accent2>
+      <a:accent3>
+        <a:srgbClr val="CACACA"/>
+      </a:accent3>
+      <a:accent4>
+        <a:srgbClr val="64FFDA"/>
+      </a:accent4>
+      <a:accent5>
+        <a:srgbClr val="FFD966"/>
+      </a:accent5>
+      <a:accent6>
+        <a:srgbClr val="F5F5F5"/>
+      </a:accent6>
+      <a:hlink>
+        <a:srgbClr val="FFD966"/>
+      </a:hlink>
+      <a:folHlink>
+        <a:srgbClr val="FFD966"/>
+      </a:folHlink>
+    </a:clrScheme>
+    <a:fontScheme name="Office">
+      <a:majorFont>
+        <a:latin typeface="Arial"/>
+        <a:ea typeface=""/>
+        <a:cs typeface=""/>
+        <a:font script="Jpan" typeface="ＭＳ Ｐゴシック"/>
+        <a:font script="Hang" typeface="맑은 고딕"/>
+        <a:font script="Hans" typeface="宋体"/>
+        <a:font script="Hant" typeface="新細明體"/>
+        <a:font script="Arab" typeface="Times New Roman"/>
+        <a:font script="Hebr" typeface="Times New Roman"/>
+        <a:font script="Thai" typeface="Angsana New"/>
+        <a:font script="Ethi" typeface="Nyala"/>
+        <a:font script="Beng" typeface="Vrinda"/>
+        <a:font script="Gujr" typeface="Shruti"/>
+        <a:font script="Khmr" typeface="MoolBoran"/>
+        <a:font script="Knda" typeface="Tunga"/>
+        <a:font script="Guru" typeface="Raavi"/>
+        <a:font script="Cans" typeface="Euphemia"/>
+        <a:font script="Cher" typeface="Plantagenet Cherokee"/>
+        <a:font script="Yiii" typeface="Microsoft Yi Baiti"/>
+        <a:font script="Tibt" typeface="Microsoft Himalaya"/>
+        <a:font script="Thaa" typeface="MV Boli"/>
+        <a:font script="Deva" typeface="Mangal"/>
+        <a:font script="Telu" typeface="Gautami"/>
+        <a:font script="Taml" typeface="Latha"/>
+        <a:font script="Syrc" typeface="Estrangelo Edessa"/>
+        <a:font script="Orya" typeface="Kalinga"/>
+        <a:font script="Mlym" typeface="Kartika"/>
+        <a:font script="Laoo" typeface="DokChampa"/>
+        <a:font script="Sinh" typeface="Iskoola Pota"/>
+        <a:font script="Mong" typeface="Mongolian Baiti"/>
+        <a:font script="Viet" typeface="Times New Roman"/>
+        <a:font script="Uigh" typeface="Microsoft Uighur"/>
+        <a:font script="Geor" typeface="Sylfaen"/>
+      </a:majorFont>
+      <a:minorFont>
+        <a:latin typeface="Arial"/>
+        <a:ea typeface=""/>
+        <a:cs typeface=""/>
+        <a:font script="Jpan" typeface="ＭＳ Ｐゴシック"/>
+        <a:font script="Hang" typeface="맑은 고딕"/>
+        <a:font script="Hans" typeface="宋体"/>
+        <a:font script="Hant" typeface="新細明體"/>
+        <a:font script="Arab" typeface="Arial"/>
+        <a:font script="Hebr" typeface="Arial"/>
+        <a:font script="Thai" typeface="Cordia New"/>
+        <a:font script="Ethi" typeface="Nyala"/>
+        <a:font script="Beng" typeface="Vrinda"/>
+        <a:font script="Gujr" typeface="Shruti"/>
+        <a:font script="Khmr" typeface="DaunPenh"/>
+        <a:font script="Knda" typeface="Tunga"/>
+        <a:font script="Guru" typeface="Raavi"/>
+        <a:font script="Cans" typeface="Euphemia"/>
+        <a:font script="Cher" typeface="Plantagenet Cherokee"/>
+        <a:font script="Yiii" typeface="Microsoft Yi Baiti"/>
+        <a:font script="Tibt" typeface="Microsoft Himalaya"/>
+        <a:font script="Thaa" typeface="MV Boli"/>
+        <a:font script="Deva" typeface="Mangal"/>
+        <a:font script="Telu" typeface="Gautami"/>
+        <a:font script="Taml" typeface="Latha"/>
+        <a:font script="Syrc" typeface="Estrangelo Edessa"/>
+        <a:font script="Orya" typeface="Kalinga"/>
+        <a:font script="Mlym" typeface="Kartika"/>
+        <a:font script="Laoo" typeface="DokChampa"/>
+        <a:font script="Sinh" typeface="Iskoola Pota"/>
+        <a:font script="Mong" typeface="Mongolian Baiti"/>
+        <a:font script="Viet" typeface="Arial"/>
+        <a:font script="Uigh" typeface="Microsoft Uighur"/>
+        <a:font script="Geor" typeface="Sylfaen"/>
+      </a:minorFont>
+    </a:fontScheme>
+    <a:fmtScheme name="Office">
+      <a:fillStyleLst>
+        <a:solidFill>
+          <a:schemeClr val="phClr"/>
+        </a:solidFill>
+        <a:gradFill rotWithShape="1">
+          <a:gsLst>
+            <a:gs pos="0">
+              <a:schemeClr val="phClr">
+                <a:tint val="50000"/>
+                <a:satMod val="300000"/>
+              </a:schemeClr>
+            </a:gs>
+            <a:gs pos="35000">
+              <a:schemeClr val="phClr">
+                <a:tint val="37000"/>
+                <a:satMod val="300000"/>
+              </a:schemeClr>
+            </a:gs>
+            <a:gs pos="100000">
+              <a:schemeClr val="phClr">
+                <a:tint val="15000"/>
+                <a:satMod val="350000"/>
+              </a:schemeClr>
+            </a:gs>
+          </a:gsLst>
+          <a:lin ang="16200000" scaled="1"/>
+        </a:gradFill>
+        <a:gradFill rotWithShape="1">
+          <a:gsLst>
+            <a:gs pos="0">
+              <a:schemeClr val="phClr">
+                <a:tint val="100000"/>
+                <a:shade val="100000"/>
+                <a:satMod val="130000"/>
+              </a:schemeClr>
+            </a:gs>
+            <a:gs pos="100000">
+              <a:schemeClr val="phClr">
+                <a:tint val="50000"/>
+                <a:shade val="100000"/>
+                <a:satMod val="350000"/>
+              </a:schemeClr>
+            </a:gs>
+          </a:gsLst>
+          <a:lin ang="16200000" scaled="0"/>
+        </a:gradFill>
+      </a:fillStyleLst>
+      <a:lnStyleLst>
+        <a:ln w="9525" cap="flat" cmpd="sng" algn="ctr">
+          <a:solidFill>
+            <a:schemeClr val="phClr">
+              <a:shade val="95000"/>
+              <a:satMod val="105000"/>
+            </a:schemeClr>
+          </a:solidFill>
+          <a:prstDash val="solid"/>
+        </a:ln>
+        <a:ln w="25400" cap="flat" cmpd="sng" algn="ctr">
+          <a:solidFill>
+            <a:schemeClr val="phClr"/>
+          </a:solidFill>
+          <a:prstDash val="solid"/>
+        </a:ln>
+        <a:ln w="38100" cap="flat" cmpd="sng" algn="ctr">
+          <a:solidFill>
+            <a:schemeClr val="phClr"/>
+          </a:solidFill>
+          <a:prstDash val="solid"/>
+        </a:ln>
+      </a:lnStyleLst>
+      <a:effectStyleLst>
+        <a:effectStyle>
+          <a:effectLst>
+            <a:outerShdw blurRad="40000" dist="20000" dir="5400000" rotWithShape="0">
+              <a:srgbClr val="000000">
+                <a:alpha val="38000"/>
+              </a:srgbClr>
+            </a:outerShdw>
+          </a:effectLst>
+        </a:effectStyle>
+        <a:effectStyle>
+          <a:effectLst>
+            <a:outerShdw blurRad="40000" dist="23000" dir="5400000" rotWithShape="0">
+              <a:srgbClr val="000000">
+                <a:alpha val="35000"/>
+              </a:srgbClr>
+            </a:outerShdw>
+          </a:effectLst>
+        </a:effectStyle>
+        <a:effectStyle>
+          <a:effectLst>
+            <a:outerShdw blurRad="40000" dist="23000" dir="5400000" rotWithShape="0">
+              <a:srgbClr val="000000">
+                <a:alpha val="35000"/>
+              </a:srgbClr>
+            </a:outerShdw>
+          </a:effectLst>
+          <a:scene3d>
+            <a:camera prst="orthographicFront">
+              <a:rot lat="0" lon="0" rev="0"/>
+            </a:camera>
+            <a:lightRig rig="threePt" dir="t">
+              <a:rot lat="0" lon="0" rev="1200000"/>
+            </a:lightRig>
+          </a:scene3d>
+          <a:sp3d>
+            <a:bevelT w="63500" h="25400"/>
+          </a:sp3d>
+        </a:effectStyle>
+      </a:effectStyleLst>
+      <a:bgFillStyleLst>
+        <a:solidFill>
+          <a:schemeClr val="phClr"/>
+        </a:solidFill>
+        <a:gradFill rotWithShape="1">
+          <a:gsLst>
+            <a:gs pos="0">
+              <a:schemeClr val="phClr">
+                <a:tint val="40000"/>
+                <a:satMod val="350000"/>
+              </a:schemeClr>
+            </a:gs>
+            <a:gs pos="40000">
+              <a:schemeClr val="phClr">
+                <a:tint val="45000"/>
+                <a:shade val="99000"/>
+                <a:satMod val="350000"/>
+              </a:schemeClr>
+            </a:gs>
+            <a:gs pos="100000">
+              <a:schemeClr val="phClr">
+                <a:shade val="20000"/>
+                <a:satMod val="255000"/>
+              </a:schemeClr>
+            </a:gs>
+          </a:gsLst>
+          <a:path path="circle">
+            <a:fillToRect l="50000" t="-80000" r="50000" b="180000"/>
+          </a:path>
+        </a:gradFill>
+        <a:gradFill rotWithShape="1">
+          <a:gsLst>
+            <a:gs pos="0">
+              <a:schemeClr val="phClr">
+                <a:tint val="80000"/>
+                <a:satMod val="300000"/>
+              </a:schemeClr>
+            </a:gs>
+            <a:gs pos="100000">
+              <a:schemeClr val="phClr">
+                <a:shade val="30000"/>
+                <a:satMod val="200000"/>
+              </a:schemeClr>
+            </a:gs>
+          </a:gsLst>
+          <a:path path="circle">
+            <a:fillToRect l="50000" t="50000" r="50000" b="50000"/>
+          </a:path>
+        </a:gradFill>
+      </a:bgFillStyleLst>
+    </a:fmtScheme>
+  </a:themeElements>
+</a:theme>
+</file>
+
+<file path=ppt/theme/theme2.xml><?xml version="1.0" encoding="utf-8"?>
 <a:theme xmlns:a="http://schemas.openxmlformats.org/drawingml/2006/main" xmlns:r="http://schemas.openxmlformats.org/officeDocument/2006/relationships">
   <a:themeElements>
     <a:clrScheme name="Default">
@@ -23991,283 +23999,4 @@
     </a:fmtScheme>
   </a:themeElements>
 </a:theme>
-</file>
-
-<file path=ppt/theme/theme2.xml><?xml version="1.0" encoding="utf-8"?>
-<a:theme xmlns:a="http://schemas.openxmlformats.org/drawingml/2006/main" xmlns:r="http://schemas.openxmlformats.org/officeDocument/2006/relationships" name="Slate">
-  <a:themeElements>
-    <a:clrScheme name="Slate">
-      <a:dk1>
-        <a:srgbClr val="FFFFFF"/>
-      </a:dk1>
-      <a:lt1>
-        <a:srgbClr val="37474F"/>
-      </a:lt1>
-      <a:dk2>
-        <a:srgbClr val="9E9E9E"/>
-      </a:dk2>
-      <a:lt2>
-        <a:srgbClr val="E0E0E0"/>
-      </a:lt2>
-      <a:accent1>
-        <a:srgbClr val="616161"/>
-      </a:accent1>
-      <a:accent2>
-        <a:srgbClr val="78909C"/>
-      </a:accent2>
-      <a:accent3>
-        <a:srgbClr val="CACACA"/>
-      </a:accent3>
-      <a:accent4>
-        <a:srgbClr val="64FFDA"/>
-      </a:accent4>
-      <a:accent5>
-        <a:srgbClr val="FFD966"/>
-      </a:accent5>
-      <a:accent6>
-        <a:srgbClr val="F5F5F5"/>
-      </a:accent6>
-      <a:hlink>
-        <a:srgbClr val="FFD966"/>
-      </a:hlink>
-      <a:folHlink>
-        <a:srgbClr val="FFD966"/>
-      </a:folHlink>
-    </a:clrScheme>
-    <a:fontScheme name="Office">
-      <a:majorFont>
-        <a:latin typeface="Arial"/>
-        <a:ea typeface=""/>
-        <a:cs typeface=""/>
-        <a:font script="Jpan" typeface="ＭＳ Ｐゴシック"/>
-        <a:font script="Hang" typeface="맑은 고딕"/>
-        <a:font script="Hans" typeface="宋体"/>
-        <a:font script="Hant" typeface="新細明體"/>
-        <a:font script="Arab" typeface="Times New Roman"/>
-        <a:font script="Hebr" typeface="Times New Roman"/>
-        <a:font script="Thai" typeface="Angsana New"/>
-        <a:font script="Ethi" typeface="Nyala"/>
-        <a:font script="Beng" typeface="Vrinda"/>
-        <a:font script="Gujr" typeface="Shruti"/>
-        <a:font script="Khmr" typeface="MoolBoran"/>
-        <a:font script="Knda" typeface="Tunga"/>
-        <a:font script="Guru" typeface="Raavi"/>
-        <a:font script="Cans" typeface="Euphemia"/>
-        <a:font script="Cher" typeface="Plantagenet Cherokee"/>
-        <a:font script="Yiii" typeface="Microsoft Yi Baiti"/>
-        <a:font script="Tibt" typeface="Microsoft Himalaya"/>
-        <a:font script="Thaa" typeface="MV Boli"/>
-        <a:font script="Deva" typeface="Mangal"/>
-        <a:font script="Telu" typeface="Gautami"/>
-        <a:font script="Taml" typeface="Latha"/>
-        <a:font script="Syrc" typeface="Estrangelo Edessa"/>
-        <a:font script="Orya" typeface="Kalinga"/>
-        <a:font script="Mlym" typeface="Kartika"/>
-        <a:font script="Laoo" typeface="DokChampa"/>
-        <a:font script="Sinh" typeface="Iskoola Pota"/>
-        <a:font script="Mong" typeface="Mongolian Baiti"/>
-        <a:font script="Viet" typeface="Times New Roman"/>
-        <a:font script="Uigh" typeface="Microsoft Uighur"/>
-        <a:font script="Geor" typeface="Sylfaen"/>
-      </a:majorFont>
-      <a:minorFont>
-        <a:latin typeface="Arial"/>
-        <a:ea typeface=""/>
-        <a:cs typeface=""/>
-        <a:font script="Jpan" typeface="ＭＳ Ｐゴシック"/>
-        <a:font script="Hang" typeface="맑은 고딕"/>
-        <a:font script="Hans" typeface="宋体"/>
-        <a:font script="Hant" typeface="新細明體"/>
-        <a:font script="Arab" typeface="Arial"/>
-        <a:font script="Hebr" typeface="Arial"/>
-        <a:font script="Thai" typeface="Cordia New"/>
-        <a:font script="Ethi" typeface="Nyala"/>
-        <a:font script="Beng" typeface="Vrinda"/>
-        <a:font script="Gujr" typeface="Shruti"/>
-        <a:font script="Khmr" typeface="DaunPenh"/>
-        <a:font script="Knda" typeface="Tunga"/>
-        <a:font script="Guru" typeface="Raavi"/>
-        <a:font script="Cans" typeface="Euphemia"/>
-        <a:font script="Cher" typeface="Plantagenet Cherokee"/>
-        <a:font script="Yiii" typeface="Microsoft Yi Baiti"/>
-        <a:font script="Tibt" typeface="Microsoft Himalaya"/>
-        <a:font script="Thaa" typeface="MV Boli"/>
-        <a:font script="Deva" typeface="Mangal"/>
-        <a:font script="Telu" typeface="Gautami"/>
-        <a:font script="Taml" typeface="Latha"/>
-        <a:font script="Syrc" typeface="Estrangelo Edessa"/>
-        <a:font script="Orya" typeface="Kalinga"/>
-        <a:font script="Mlym" typeface="Kartika"/>
-        <a:font script="Laoo" typeface="DokChampa"/>
-        <a:font script="Sinh" typeface="Iskoola Pota"/>
-        <a:font script="Mong" typeface="Mongolian Baiti"/>
-        <a:font script="Viet" typeface="Arial"/>
-        <a:font script="Uigh" typeface="Microsoft Uighur"/>
-        <a:font script="Geor" typeface="Sylfaen"/>
-      </a:minorFont>
-    </a:fontScheme>
-    <a:fmtScheme name="Office">
-      <a:fillStyleLst>
-        <a:solidFill>
-          <a:schemeClr val="phClr"/>
-        </a:solidFill>
-        <a:gradFill rotWithShape="1">
-          <a:gsLst>
-            <a:gs pos="0">
-              <a:schemeClr val="phClr">
-                <a:tint val="50000"/>
-                <a:satMod val="300000"/>
-              </a:schemeClr>
-            </a:gs>
-            <a:gs pos="35000">
-              <a:schemeClr val="phClr">
-                <a:tint val="37000"/>
-                <a:satMod val="300000"/>
-              </a:schemeClr>
-            </a:gs>
-            <a:gs pos="100000">
-              <a:schemeClr val="phClr">
-                <a:tint val="15000"/>
-                <a:satMod val="350000"/>
-              </a:schemeClr>
-            </a:gs>
-          </a:gsLst>
-          <a:lin ang="16200000" scaled="1"/>
-        </a:gradFill>
-        <a:gradFill rotWithShape="1">
-          <a:gsLst>
-            <a:gs pos="0">
-              <a:schemeClr val="phClr">
-                <a:tint val="100000"/>
-                <a:shade val="100000"/>
-                <a:satMod val="130000"/>
-              </a:schemeClr>
-            </a:gs>
-            <a:gs pos="100000">
-              <a:schemeClr val="phClr">
-                <a:tint val="50000"/>
-                <a:shade val="100000"/>
-                <a:satMod val="350000"/>
-              </a:schemeClr>
-            </a:gs>
-          </a:gsLst>
-          <a:lin ang="16200000" scaled="0"/>
-        </a:gradFill>
-      </a:fillStyleLst>
-      <a:lnStyleLst>
-        <a:ln w="9525" cap="flat" cmpd="sng" algn="ctr">
-          <a:solidFill>
-            <a:schemeClr val="phClr">
-              <a:shade val="95000"/>
-              <a:satMod val="105000"/>
-            </a:schemeClr>
-          </a:solidFill>
-          <a:prstDash val="solid"/>
-        </a:ln>
-        <a:ln w="25400" cap="flat" cmpd="sng" algn="ctr">
-          <a:solidFill>
-            <a:schemeClr val="phClr"/>
-          </a:solidFill>
-          <a:prstDash val="solid"/>
-        </a:ln>
-        <a:ln w="38100" cap="flat" cmpd="sng" algn="ctr">
-          <a:solidFill>
-            <a:schemeClr val="phClr"/>
-          </a:solidFill>
-          <a:prstDash val="solid"/>
-        </a:ln>
-      </a:lnStyleLst>
-      <a:effectStyleLst>
-        <a:effectStyle>
-          <a:effectLst>
-            <a:outerShdw blurRad="40000" dist="20000" dir="5400000" rotWithShape="0">
-              <a:srgbClr val="000000">
-                <a:alpha val="38000"/>
-              </a:srgbClr>
-            </a:outerShdw>
-          </a:effectLst>
-        </a:effectStyle>
-        <a:effectStyle>
-          <a:effectLst>
-            <a:outerShdw blurRad="40000" dist="23000" dir="5400000" rotWithShape="0">
-              <a:srgbClr val="000000">
-                <a:alpha val="35000"/>
-              </a:srgbClr>
-            </a:outerShdw>
-          </a:effectLst>
-        </a:effectStyle>
-        <a:effectStyle>
-          <a:effectLst>
-            <a:outerShdw blurRad="40000" dist="23000" dir="5400000" rotWithShape="0">
-              <a:srgbClr val="000000">
-                <a:alpha val="35000"/>
-              </a:srgbClr>
-            </a:outerShdw>
-          </a:effectLst>
-          <a:scene3d>
-            <a:camera prst="orthographicFront">
-              <a:rot lat="0" lon="0" rev="0"/>
-            </a:camera>
-            <a:lightRig rig="threePt" dir="t">
-              <a:rot lat="0" lon="0" rev="1200000"/>
-            </a:lightRig>
-          </a:scene3d>
-          <a:sp3d>
-            <a:bevelT w="63500" h="25400"/>
-          </a:sp3d>
-        </a:effectStyle>
-      </a:effectStyleLst>
-      <a:bgFillStyleLst>
-        <a:solidFill>
-          <a:schemeClr val="phClr"/>
-        </a:solidFill>
-        <a:gradFill rotWithShape="1">
-          <a:gsLst>
-            <a:gs pos="0">
-              <a:schemeClr val="phClr">
-                <a:tint val="40000"/>
-                <a:satMod val="350000"/>
-              </a:schemeClr>
-            </a:gs>
-            <a:gs pos="40000">
-              <a:schemeClr val="phClr">
-                <a:tint val="45000"/>
-                <a:shade val="99000"/>
-                <a:satMod val="350000"/>
-              </a:schemeClr>
-            </a:gs>
-            <a:gs pos="100000">
-              <a:schemeClr val="phClr">
-                <a:shade val="20000"/>
-                <a:satMod val="255000"/>
-              </a:schemeClr>
-            </a:gs>
-          </a:gsLst>
-          <a:path path="circle">
-            <a:fillToRect l="50000" t="-80000" r="50000" b="180000"/>
-          </a:path>
-        </a:gradFill>
-        <a:gradFill rotWithShape="1">
-          <a:gsLst>
-            <a:gs pos="0">
-              <a:schemeClr val="phClr">
-                <a:tint val="80000"/>
-                <a:satMod val="300000"/>
-              </a:schemeClr>
-            </a:gs>
-            <a:gs pos="100000">
-              <a:schemeClr val="phClr">
-                <a:shade val="30000"/>
-                <a:satMod val="200000"/>
-              </a:schemeClr>
-            </a:gs>
-          </a:gsLst>
-          <a:path path="circle">
-            <a:fillToRect l="50000" t="50000" r="50000" b="50000"/>
-          </a:path>
-        </a:gradFill>
-      </a:bgFillStyleLst>
-    </a:fmtScheme>
-  </a:themeElements>
-</a:theme>
 </file>
</xml_diff>